<commit_message>
Updated DG for import and export features.
</commit_message>
<xml_diff>
--- a/docs/diagrams/StorageComponentClassDiagram.pptx
+++ b/docs/diagrams/StorageComponentClassDiagram.pptx
@@ -107,6 +107,22 @@
       </a:defRPr>
     </a:lvl9pPr>
   </p:defaultTextStyle>
+  <p:extLst>
+    <p:ext uri="{EFAFB233-063F-42B5-8137-9DF3F51BA10A}">
+      <p15:sldGuideLst xmlns:p15="http://schemas.microsoft.com/office/powerpoint/2012/main">
+        <p15:guide id="1" orient="horz" pos="1488">
+          <p15:clr>
+            <a:srgbClr val="A4A3A4"/>
+          </p15:clr>
+        </p15:guide>
+        <p15:guide id="2" pos="2880">
+          <p15:clr>
+            <a:srgbClr val="A4A3A4"/>
+          </p15:clr>
+        </p15:guide>
+      </p15:sldGuideLst>
+    </p:ext>
+  </p:extLst>
 </p:presentation>
 </file>
 
@@ -192,7 +208,7 @@
           <a:p>
             <a:fld id="{F5CC4B3F-88C1-4FFA-B1B6-F41C21DC6924}" type="datetimeFigureOut">
               <a:rPr lang="en-US" smtClean="0"/>
-              <a:t>10/16/2016</a:t>
+              <a:t>10/15/2018</a:t>
             </a:fld>
             <a:endParaRPr lang="en-US"/>
           </a:p>
@@ -256,38 +272,37 @@
           <a:p>
             <a:pPr lvl="0"/>
             <a:r>
-              <a:rPr lang="en-US" smtClean="0"/>
+              <a:rPr lang="en-US"/>
               <a:t>Click to edit Master text styles</a:t>
             </a:r>
           </a:p>
           <a:p>
             <a:pPr lvl="1"/>
             <a:r>
-              <a:rPr lang="en-US" smtClean="0"/>
+              <a:rPr lang="en-US"/>
               <a:t>Second level</a:t>
             </a:r>
           </a:p>
           <a:p>
             <a:pPr lvl="2"/>
             <a:r>
-              <a:rPr lang="en-US" smtClean="0"/>
+              <a:rPr lang="en-US"/>
               <a:t>Third level</a:t>
             </a:r>
           </a:p>
           <a:p>
             <a:pPr lvl="3"/>
             <a:r>
-              <a:rPr lang="en-US" smtClean="0"/>
+              <a:rPr lang="en-US"/>
               <a:t>Fourth level</a:t>
             </a:r>
           </a:p>
           <a:p>
             <a:pPr lvl="4"/>
             <a:r>
-              <a:rPr lang="en-US" smtClean="0"/>
+              <a:rPr lang="en-US"/>
               <a:t>Fifth level</a:t>
             </a:r>
-            <a:endParaRPr lang="en-US"/>
           </a:p>
         </p:txBody>
       </p:sp>
@@ -498,10 +513,9 @@
           <a:lstStyle/>
           <a:p>
             <a:r>
-              <a:rPr lang="en-US" smtClean="0"/>
+              <a:rPr lang="en-US"/>
               <a:t>Click to edit Master title style</a:t>
             </a:r>
-            <a:endParaRPr lang="en-US"/>
           </a:p>
         </p:txBody>
       </p:sp>
@@ -617,10 +631,9 @@
           </a:lstStyle>
           <a:p>
             <a:r>
-              <a:rPr lang="en-US" smtClean="0"/>
+              <a:rPr lang="en-US"/>
               <a:t>Click to edit Master subtitle style</a:t>
             </a:r>
-            <a:endParaRPr lang="en-US"/>
           </a:p>
         </p:txBody>
       </p:sp>
@@ -641,7 +654,7 @@
           <a:p>
             <a:fld id="{78C97017-6FC3-485B-9764-EAC9E56C1D49}" type="datetimeFigureOut">
               <a:rPr lang="en-US" smtClean="0"/>
-              <a:t>10/16/2016</a:t>
+              <a:t>10/15/2018</a:t>
             </a:fld>
             <a:endParaRPr lang="en-US"/>
           </a:p>
@@ -735,10 +748,9 @@
           <a:lstStyle/>
           <a:p>
             <a:r>
-              <a:rPr lang="en-US" smtClean="0"/>
+              <a:rPr lang="en-US"/>
               <a:t>Click to edit Master title style</a:t>
             </a:r>
-            <a:endParaRPr lang="en-US"/>
           </a:p>
         </p:txBody>
       </p:sp>
@@ -759,38 +771,37 @@
           <a:p>
             <a:pPr lvl="0"/>
             <a:r>
-              <a:rPr lang="en-US" smtClean="0"/>
+              <a:rPr lang="en-US"/>
               <a:t>Click to edit Master text styles</a:t>
             </a:r>
           </a:p>
           <a:p>
             <a:pPr lvl="1"/>
             <a:r>
-              <a:rPr lang="en-US" smtClean="0"/>
+              <a:rPr lang="en-US"/>
               <a:t>Second level</a:t>
             </a:r>
           </a:p>
           <a:p>
             <a:pPr lvl="2"/>
             <a:r>
-              <a:rPr lang="en-US" smtClean="0"/>
+              <a:rPr lang="en-US"/>
               <a:t>Third level</a:t>
             </a:r>
           </a:p>
           <a:p>
             <a:pPr lvl="3"/>
             <a:r>
-              <a:rPr lang="en-US" smtClean="0"/>
+              <a:rPr lang="en-US"/>
               <a:t>Fourth level</a:t>
             </a:r>
           </a:p>
           <a:p>
             <a:pPr lvl="4"/>
             <a:r>
-              <a:rPr lang="en-US" smtClean="0"/>
+              <a:rPr lang="en-US"/>
               <a:t>Fifth level</a:t>
             </a:r>
-            <a:endParaRPr lang="en-US"/>
           </a:p>
         </p:txBody>
       </p:sp>
@@ -811,7 +822,7 @@
           <a:p>
             <a:fld id="{78C97017-6FC3-485B-9764-EAC9E56C1D49}" type="datetimeFigureOut">
               <a:rPr lang="en-US" smtClean="0"/>
-              <a:t>10/16/2016</a:t>
+              <a:t>10/15/2018</a:t>
             </a:fld>
             <a:endParaRPr lang="en-US"/>
           </a:p>
@@ -910,10 +921,9 @@
           <a:lstStyle/>
           <a:p>
             <a:r>
-              <a:rPr lang="en-US" smtClean="0"/>
+              <a:rPr lang="en-US"/>
               <a:t>Click to edit Master title style</a:t>
             </a:r>
-            <a:endParaRPr lang="en-US"/>
           </a:p>
         </p:txBody>
       </p:sp>
@@ -939,38 +949,37 @@
           <a:p>
             <a:pPr lvl="0"/>
             <a:r>
-              <a:rPr lang="en-US" smtClean="0"/>
+              <a:rPr lang="en-US"/>
               <a:t>Click to edit Master text styles</a:t>
             </a:r>
           </a:p>
           <a:p>
             <a:pPr lvl="1"/>
             <a:r>
-              <a:rPr lang="en-US" smtClean="0"/>
+              <a:rPr lang="en-US"/>
               <a:t>Second level</a:t>
             </a:r>
           </a:p>
           <a:p>
             <a:pPr lvl="2"/>
             <a:r>
-              <a:rPr lang="en-US" smtClean="0"/>
+              <a:rPr lang="en-US"/>
               <a:t>Third level</a:t>
             </a:r>
           </a:p>
           <a:p>
             <a:pPr lvl="3"/>
             <a:r>
-              <a:rPr lang="en-US" smtClean="0"/>
+              <a:rPr lang="en-US"/>
               <a:t>Fourth level</a:t>
             </a:r>
           </a:p>
           <a:p>
             <a:pPr lvl="4"/>
             <a:r>
-              <a:rPr lang="en-US" smtClean="0"/>
+              <a:rPr lang="en-US"/>
               <a:t>Fifth level</a:t>
             </a:r>
-            <a:endParaRPr lang="en-US"/>
           </a:p>
         </p:txBody>
       </p:sp>
@@ -991,7 +1000,7 @@
           <a:p>
             <a:fld id="{78C97017-6FC3-485B-9764-EAC9E56C1D49}" type="datetimeFigureOut">
               <a:rPr lang="en-US" smtClean="0"/>
-              <a:t>10/16/2016</a:t>
+              <a:t>10/15/2018</a:t>
             </a:fld>
             <a:endParaRPr lang="en-US"/>
           </a:p>
@@ -1085,10 +1094,9 @@
           <a:lstStyle/>
           <a:p>
             <a:r>
-              <a:rPr lang="en-US" smtClean="0"/>
+              <a:rPr lang="en-US"/>
               <a:t>Click to edit Master title style</a:t>
             </a:r>
-            <a:endParaRPr lang="en-US"/>
           </a:p>
         </p:txBody>
       </p:sp>
@@ -1109,38 +1117,37 @@
           <a:p>
             <a:pPr lvl="0"/>
             <a:r>
-              <a:rPr lang="en-US" smtClean="0"/>
+              <a:rPr lang="en-US"/>
               <a:t>Click to edit Master text styles</a:t>
             </a:r>
           </a:p>
           <a:p>
             <a:pPr lvl="1"/>
             <a:r>
-              <a:rPr lang="en-US" smtClean="0"/>
+              <a:rPr lang="en-US"/>
               <a:t>Second level</a:t>
             </a:r>
           </a:p>
           <a:p>
             <a:pPr lvl="2"/>
             <a:r>
-              <a:rPr lang="en-US" smtClean="0"/>
+              <a:rPr lang="en-US"/>
               <a:t>Third level</a:t>
             </a:r>
           </a:p>
           <a:p>
             <a:pPr lvl="3"/>
             <a:r>
-              <a:rPr lang="en-US" smtClean="0"/>
+              <a:rPr lang="en-US"/>
               <a:t>Fourth level</a:t>
             </a:r>
           </a:p>
           <a:p>
             <a:pPr lvl="4"/>
             <a:r>
-              <a:rPr lang="en-US" smtClean="0"/>
+              <a:rPr lang="en-US"/>
               <a:t>Fifth level</a:t>
             </a:r>
-            <a:endParaRPr lang="en-US"/>
           </a:p>
         </p:txBody>
       </p:sp>
@@ -1161,7 +1168,7 @@
           <a:p>
             <a:fld id="{78C97017-6FC3-485B-9764-EAC9E56C1D49}" type="datetimeFigureOut">
               <a:rPr lang="en-US" smtClean="0"/>
-              <a:t>10/16/2016</a:t>
+              <a:t>10/15/2018</a:t>
             </a:fld>
             <a:endParaRPr lang="en-US"/>
           </a:p>
@@ -1264,10 +1271,9 @@
           </a:lstStyle>
           <a:p>
             <a:r>
-              <a:rPr lang="en-US" smtClean="0"/>
+              <a:rPr lang="en-US"/>
               <a:t>Click to edit Master title style</a:t>
             </a:r>
-            <a:endParaRPr lang="en-US"/>
           </a:p>
         </p:txBody>
       </p:sp>
@@ -1384,7 +1390,7 @@
           <a:p>
             <a:pPr lvl="0"/>
             <a:r>
-              <a:rPr lang="en-US" smtClean="0"/>
+              <a:rPr lang="en-US"/>
               <a:t>Click to edit Master text styles</a:t>
             </a:r>
           </a:p>
@@ -1407,7 +1413,7 @@
           <a:p>
             <a:fld id="{78C97017-6FC3-485B-9764-EAC9E56C1D49}" type="datetimeFigureOut">
               <a:rPr lang="en-US" smtClean="0"/>
-              <a:t>10/16/2016</a:t>
+              <a:t>10/15/2018</a:t>
             </a:fld>
             <a:endParaRPr lang="en-US"/>
           </a:p>
@@ -1501,10 +1507,9 @@
           <a:lstStyle/>
           <a:p>
             <a:r>
-              <a:rPr lang="en-US" smtClean="0"/>
+              <a:rPr lang="en-US"/>
               <a:t>Click to edit Master title style</a:t>
             </a:r>
-            <a:endParaRPr lang="en-US"/>
           </a:p>
         </p:txBody>
       </p:sp>
@@ -1558,38 +1563,37 @@
           <a:p>
             <a:pPr lvl="0"/>
             <a:r>
-              <a:rPr lang="en-US" smtClean="0"/>
+              <a:rPr lang="en-US"/>
               <a:t>Click to edit Master text styles</a:t>
             </a:r>
           </a:p>
           <a:p>
             <a:pPr lvl="1"/>
             <a:r>
-              <a:rPr lang="en-US" smtClean="0"/>
+              <a:rPr lang="en-US"/>
               <a:t>Second level</a:t>
             </a:r>
           </a:p>
           <a:p>
             <a:pPr lvl="2"/>
             <a:r>
-              <a:rPr lang="en-US" smtClean="0"/>
+              <a:rPr lang="en-US"/>
               <a:t>Third level</a:t>
             </a:r>
           </a:p>
           <a:p>
             <a:pPr lvl="3"/>
             <a:r>
-              <a:rPr lang="en-US" smtClean="0"/>
+              <a:rPr lang="en-US"/>
               <a:t>Fourth level</a:t>
             </a:r>
           </a:p>
           <a:p>
             <a:pPr lvl="4"/>
             <a:r>
-              <a:rPr lang="en-US" smtClean="0"/>
+              <a:rPr lang="en-US"/>
               <a:t>Fifth level</a:t>
             </a:r>
-            <a:endParaRPr lang="en-US"/>
           </a:p>
         </p:txBody>
       </p:sp>
@@ -1643,38 +1647,37 @@
           <a:p>
             <a:pPr lvl="0"/>
             <a:r>
-              <a:rPr lang="en-US" smtClean="0"/>
+              <a:rPr lang="en-US"/>
               <a:t>Click to edit Master text styles</a:t>
             </a:r>
           </a:p>
           <a:p>
             <a:pPr lvl="1"/>
             <a:r>
-              <a:rPr lang="en-US" smtClean="0"/>
+              <a:rPr lang="en-US"/>
               <a:t>Second level</a:t>
             </a:r>
           </a:p>
           <a:p>
             <a:pPr lvl="2"/>
             <a:r>
-              <a:rPr lang="en-US" smtClean="0"/>
+              <a:rPr lang="en-US"/>
               <a:t>Third level</a:t>
             </a:r>
           </a:p>
           <a:p>
             <a:pPr lvl="3"/>
             <a:r>
-              <a:rPr lang="en-US" smtClean="0"/>
+              <a:rPr lang="en-US"/>
               <a:t>Fourth level</a:t>
             </a:r>
           </a:p>
           <a:p>
             <a:pPr lvl="4"/>
             <a:r>
-              <a:rPr lang="en-US" smtClean="0"/>
+              <a:rPr lang="en-US"/>
               <a:t>Fifth level</a:t>
             </a:r>
-            <a:endParaRPr lang="en-US"/>
           </a:p>
         </p:txBody>
       </p:sp>
@@ -1695,7 +1698,7 @@
           <a:p>
             <a:fld id="{78C97017-6FC3-485B-9764-EAC9E56C1D49}" type="datetimeFigureOut">
               <a:rPr lang="en-US" smtClean="0"/>
-              <a:t>10/16/2016</a:t>
+              <a:t>10/15/2018</a:t>
             </a:fld>
             <a:endParaRPr lang="en-US"/>
           </a:p>
@@ -1793,10 +1796,9 @@
           </a:lstStyle>
           <a:p>
             <a:r>
-              <a:rPr lang="en-US" smtClean="0"/>
+              <a:rPr lang="en-US"/>
               <a:t>Click to edit Master title style</a:t>
             </a:r>
-            <a:endParaRPr lang="en-US"/>
           </a:p>
         </p:txBody>
       </p:sp>
@@ -1859,7 +1861,7 @@
           <a:p>
             <a:pPr lvl="0"/>
             <a:r>
-              <a:rPr lang="en-US" smtClean="0"/>
+              <a:rPr lang="en-US"/>
               <a:t>Click to edit Master text styles</a:t>
             </a:r>
           </a:p>
@@ -1915,38 +1917,37 @@
           <a:p>
             <a:pPr lvl="0"/>
             <a:r>
-              <a:rPr lang="en-US" smtClean="0"/>
+              <a:rPr lang="en-US"/>
               <a:t>Click to edit Master text styles</a:t>
             </a:r>
           </a:p>
           <a:p>
             <a:pPr lvl="1"/>
             <a:r>
-              <a:rPr lang="en-US" smtClean="0"/>
+              <a:rPr lang="en-US"/>
               <a:t>Second level</a:t>
             </a:r>
           </a:p>
           <a:p>
             <a:pPr lvl="2"/>
             <a:r>
-              <a:rPr lang="en-US" smtClean="0"/>
+              <a:rPr lang="en-US"/>
               <a:t>Third level</a:t>
             </a:r>
           </a:p>
           <a:p>
             <a:pPr lvl="3"/>
             <a:r>
-              <a:rPr lang="en-US" smtClean="0"/>
+              <a:rPr lang="en-US"/>
               <a:t>Fourth level</a:t>
             </a:r>
           </a:p>
           <a:p>
             <a:pPr lvl="4"/>
             <a:r>
-              <a:rPr lang="en-US" smtClean="0"/>
+              <a:rPr lang="en-US"/>
               <a:t>Fifth level</a:t>
             </a:r>
-            <a:endParaRPr lang="en-US"/>
           </a:p>
         </p:txBody>
       </p:sp>
@@ -2009,7 +2010,7 @@
           <a:p>
             <a:pPr lvl="0"/>
             <a:r>
-              <a:rPr lang="en-US" smtClean="0"/>
+              <a:rPr lang="en-US"/>
               <a:t>Click to edit Master text styles</a:t>
             </a:r>
           </a:p>
@@ -2065,38 +2066,37 @@
           <a:p>
             <a:pPr lvl="0"/>
             <a:r>
-              <a:rPr lang="en-US" smtClean="0"/>
+              <a:rPr lang="en-US"/>
               <a:t>Click to edit Master text styles</a:t>
             </a:r>
           </a:p>
           <a:p>
             <a:pPr lvl="1"/>
             <a:r>
-              <a:rPr lang="en-US" smtClean="0"/>
+              <a:rPr lang="en-US"/>
               <a:t>Second level</a:t>
             </a:r>
           </a:p>
           <a:p>
             <a:pPr lvl="2"/>
             <a:r>
-              <a:rPr lang="en-US" smtClean="0"/>
+              <a:rPr lang="en-US"/>
               <a:t>Third level</a:t>
             </a:r>
           </a:p>
           <a:p>
             <a:pPr lvl="3"/>
             <a:r>
-              <a:rPr lang="en-US" smtClean="0"/>
+              <a:rPr lang="en-US"/>
               <a:t>Fourth level</a:t>
             </a:r>
           </a:p>
           <a:p>
             <a:pPr lvl="4"/>
             <a:r>
-              <a:rPr lang="en-US" smtClean="0"/>
+              <a:rPr lang="en-US"/>
               <a:t>Fifth level</a:t>
             </a:r>
-            <a:endParaRPr lang="en-US"/>
           </a:p>
         </p:txBody>
       </p:sp>
@@ -2117,7 +2117,7 @@
           <a:p>
             <a:fld id="{78C97017-6FC3-485B-9764-EAC9E56C1D49}" type="datetimeFigureOut">
               <a:rPr lang="en-US" smtClean="0"/>
-              <a:t>10/16/2016</a:t>
+              <a:t>10/15/2018</a:t>
             </a:fld>
             <a:endParaRPr lang="en-US"/>
           </a:p>
@@ -2211,10 +2211,9 @@
           <a:lstStyle/>
           <a:p>
             <a:r>
-              <a:rPr lang="en-US" smtClean="0"/>
+              <a:rPr lang="en-US"/>
               <a:t>Click to edit Master title style</a:t>
             </a:r>
-            <a:endParaRPr lang="en-US"/>
           </a:p>
         </p:txBody>
       </p:sp>
@@ -2235,7 +2234,7 @@
           <a:p>
             <a:fld id="{78C97017-6FC3-485B-9764-EAC9E56C1D49}" type="datetimeFigureOut">
               <a:rPr lang="en-US" smtClean="0"/>
-              <a:t>10/16/2016</a:t>
+              <a:t>10/15/2018</a:t>
             </a:fld>
             <a:endParaRPr lang="en-US"/>
           </a:p>
@@ -2330,7 +2329,7 @@
           <a:p>
             <a:fld id="{78C97017-6FC3-485B-9764-EAC9E56C1D49}" type="datetimeFigureOut">
               <a:rPr lang="en-US" smtClean="0"/>
-              <a:t>10/16/2016</a:t>
+              <a:t>10/15/2018</a:t>
             </a:fld>
             <a:endParaRPr lang="en-US"/>
           </a:p>
@@ -2433,10 +2432,9 @@
           </a:lstStyle>
           <a:p>
             <a:r>
-              <a:rPr lang="en-US" smtClean="0"/>
+              <a:rPr lang="en-US"/>
               <a:t>Click to edit Master title style</a:t>
             </a:r>
-            <a:endParaRPr lang="en-US"/>
           </a:p>
         </p:txBody>
       </p:sp>
@@ -2490,38 +2488,37 @@
           <a:p>
             <a:pPr lvl="0"/>
             <a:r>
-              <a:rPr lang="en-US" smtClean="0"/>
+              <a:rPr lang="en-US"/>
               <a:t>Click to edit Master text styles</a:t>
             </a:r>
           </a:p>
           <a:p>
             <a:pPr lvl="1"/>
             <a:r>
-              <a:rPr lang="en-US" smtClean="0"/>
+              <a:rPr lang="en-US"/>
               <a:t>Second level</a:t>
             </a:r>
           </a:p>
           <a:p>
             <a:pPr lvl="2"/>
             <a:r>
-              <a:rPr lang="en-US" smtClean="0"/>
+              <a:rPr lang="en-US"/>
               <a:t>Third level</a:t>
             </a:r>
           </a:p>
           <a:p>
             <a:pPr lvl="3"/>
             <a:r>
-              <a:rPr lang="en-US" smtClean="0"/>
+              <a:rPr lang="en-US"/>
               <a:t>Fourth level</a:t>
             </a:r>
           </a:p>
           <a:p>
             <a:pPr lvl="4"/>
             <a:r>
-              <a:rPr lang="en-US" smtClean="0"/>
+              <a:rPr lang="en-US"/>
               <a:t>Fifth level</a:t>
             </a:r>
-            <a:endParaRPr lang="en-US"/>
           </a:p>
         </p:txBody>
       </p:sp>
@@ -2584,7 +2581,7 @@
           <a:p>
             <a:pPr lvl="0"/>
             <a:r>
-              <a:rPr lang="en-US" smtClean="0"/>
+              <a:rPr lang="en-US"/>
               <a:t>Click to edit Master text styles</a:t>
             </a:r>
           </a:p>
@@ -2607,7 +2604,7 @@
           <a:p>
             <a:fld id="{78C97017-6FC3-485B-9764-EAC9E56C1D49}" type="datetimeFigureOut">
               <a:rPr lang="en-US" smtClean="0"/>
-              <a:t>10/16/2016</a:t>
+              <a:t>10/15/2018</a:t>
             </a:fld>
             <a:endParaRPr lang="en-US"/>
           </a:p>
@@ -2710,10 +2707,9 @@
           </a:lstStyle>
           <a:p>
             <a:r>
-              <a:rPr lang="en-US" smtClean="0"/>
+              <a:rPr lang="en-US"/>
               <a:t>Click to edit Master title style</a:t>
             </a:r>
-            <a:endParaRPr lang="en-US"/>
           </a:p>
         </p:txBody>
       </p:sp>
@@ -2837,7 +2833,7 @@
           <a:p>
             <a:pPr lvl="0"/>
             <a:r>
-              <a:rPr lang="en-US" smtClean="0"/>
+              <a:rPr lang="en-US"/>
               <a:t>Click to edit Master text styles</a:t>
             </a:r>
           </a:p>
@@ -2860,7 +2856,7 @@
           <a:p>
             <a:fld id="{78C97017-6FC3-485B-9764-EAC9E56C1D49}" type="datetimeFigureOut">
               <a:rPr lang="en-US" smtClean="0"/>
-              <a:t>10/16/2016</a:t>
+              <a:t>10/15/2018</a:t>
             </a:fld>
             <a:endParaRPr lang="en-US"/>
           </a:p>
@@ -2969,10 +2965,9 @@
           <a:lstStyle/>
           <a:p>
             <a:r>
-              <a:rPr lang="en-US" smtClean="0"/>
+              <a:rPr lang="en-US"/>
               <a:t>Click to edit Master title style</a:t>
             </a:r>
-            <a:endParaRPr lang="en-US"/>
           </a:p>
         </p:txBody>
       </p:sp>
@@ -3003,38 +2998,37 @@
           <a:p>
             <a:pPr lvl="0"/>
             <a:r>
-              <a:rPr lang="en-US" smtClean="0"/>
+              <a:rPr lang="en-US"/>
               <a:t>Click to edit Master text styles</a:t>
             </a:r>
           </a:p>
           <a:p>
             <a:pPr lvl="1"/>
             <a:r>
-              <a:rPr lang="en-US" smtClean="0"/>
+              <a:rPr lang="en-US"/>
               <a:t>Second level</a:t>
             </a:r>
           </a:p>
           <a:p>
             <a:pPr lvl="2"/>
             <a:r>
-              <a:rPr lang="en-US" smtClean="0"/>
+              <a:rPr lang="en-US"/>
               <a:t>Third level</a:t>
             </a:r>
           </a:p>
           <a:p>
             <a:pPr lvl="3"/>
             <a:r>
-              <a:rPr lang="en-US" smtClean="0"/>
+              <a:rPr lang="en-US"/>
               <a:t>Fourth level</a:t>
             </a:r>
           </a:p>
           <a:p>
             <a:pPr lvl="4"/>
             <a:r>
-              <a:rPr lang="en-US" smtClean="0"/>
+              <a:rPr lang="en-US"/>
               <a:t>Fifth level</a:t>
             </a:r>
-            <a:endParaRPr lang="en-US"/>
           </a:p>
         </p:txBody>
       </p:sp>
@@ -3073,7 +3067,7 @@
           <a:p>
             <a:fld id="{78C97017-6FC3-485B-9764-EAC9E56C1D49}" type="datetimeFigureOut">
               <a:rPr lang="en-US" smtClean="0"/>
-              <a:t>10/16/2016</a:t>
+              <a:t>10/15/2018</a:t>
             </a:fld>
             <a:endParaRPr lang="en-US"/>
           </a:p>
@@ -3456,8 +3450,8 @@
         </p:nvSpPr>
         <p:spPr>
           <a:xfrm>
-            <a:off x="1119865" y="2086382"/>
-            <a:ext cx="7871735" cy="1723618"/>
+            <a:off x="1119865" y="1603060"/>
+            <a:ext cx="7871735" cy="2206940"/>
           </a:xfrm>
           <a:prstGeom prst="roundRect">
             <a:avLst>
@@ -3494,7 +3488,7 @@
           <a:lstStyle/>
           <a:p>
             <a:r>
-              <a:rPr lang="en-US" sz="1200" b="1" dirty="0" smtClean="0">
+              <a:rPr lang="en-US" sz="1200" b="1" dirty="0">
                 <a:solidFill>
                   <a:schemeClr val="accent6">
                     <a:lumMod val="75000"/>
@@ -3561,7 +3555,7 @@
           <a:p>
             <a:pPr algn="ctr"/>
             <a:r>
-              <a:rPr lang="en-US" sz="1050" dirty="0" smtClean="0">
+              <a:rPr lang="en-US" sz="1050" dirty="0">
                 <a:solidFill>
                   <a:schemeClr val="bg1"/>
                 </a:solidFill>
@@ -3569,14 +3563,14 @@
               <a:t>&lt;&lt;interface&gt;&gt;</a:t>
             </a:r>
             <a:br>
-              <a:rPr lang="en-US" sz="1050" dirty="0" smtClean="0">
+              <a:rPr lang="en-US" sz="1050" dirty="0">
                 <a:solidFill>
                   <a:schemeClr val="bg1"/>
                 </a:solidFill>
               </a:rPr>
             </a:br>
             <a:r>
-              <a:rPr lang="en-US" sz="1050" dirty="0" err="1" smtClean="0">
+              <a:rPr lang="en-US" sz="1050" dirty="0" err="1">
                 <a:solidFill>
                   <a:schemeClr val="bg1"/>
                 </a:solidFill>
@@ -3599,8 +3593,8 @@
         </p:nvSpPr>
         <p:spPr>
           <a:xfrm rot="16200000">
-            <a:off x="1683963" y="2868687"/>
-            <a:ext cx="1093635" cy="346760"/>
+            <a:off x="1388839" y="2573563"/>
+            <a:ext cx="1683883" cy="346760"/>
           </a:xfrm>
           <a:prstGeom prst="rect">
             <a:avLst/>
@@ -3639,7 +3633,7 @@
           <a:p>
             <a:pPr algn="ctr"/>
             <a:r>
-              <a:rPr lang="en-US" sz="1050" dirty="0" err="1" smtClean="0">
+              <a:rPr lang="en-US" sz="1050" dirty="0" err="1">
                 <a:solidFill>
                   <a:schemeClr val="bg1"/>
                 </a:solidFill>
@@ -3662,8 +3656,8 @@
         </p:nvSpPr>
         <p:spPr>
           <a:xfrm rot="16200000">
-            <a:off x="956202" y="2861202"/>
-            <a:ext cx="1093635" cy="346760"/>
+            <a:off x="664820" y="2569820"/>
+            <a:ext cx="1676399" cy="346760"/>
           </a:xfrm>
           <a:prstGeom prst="rect">
             <a:avLst/>
@@ -3713,7 +3707,7 @@
           <a:p>
             <a:pPr algn="ctr"/>
             <a:r>
-              <a:rPr lang="en-US" sz="1050" dirty="0" smtClean="0">
+              <a:rPr lang="en-US" sz="1050" dirty="0">
                 <a:solidFill>
                   <a:schemeClr val="bg1"/>
                 </a:solidFill>
@@ -4147,7 +4141,7 @@
           <a:p>
             <a:pPr algn="ctr"/>
             <a:r>
-              <a:rPr lang="en-US" sz="1050" b="1" dirty="0" err="1" smtClean="0">
+              <a:rPr lang="en-US" sz="1050" b="1" dirty="0" err="1">
                 <a:solidFill>
                   <a:schemeClr val="accent6">
                     <a:lumMod val="75000"/>
@@ -4156,18 +4150,8 @@
               </a:rPr>
               <a:t>XmlAddressBook</a:t>
             </a:r>
-            <a:r>
-              <a:rPr lang="en-US" sz="1050" b="1" dirty="0" smtClean="0">
-                <a:solidFill>
-                  <a:schemeClr val="accent6">
-                    <a:lumMod val="75000"/>
-                  </a:schemeClr>
-                </a:solidFill>
-              </a:rPr>
-              <a:t/>
-            </a:r>
             <a:br>
-              <a:rPr lang="en-US" sz="1050" b="1" dirty="0" smtClean="0">
+              <a:rPr lang="en-US" sz="1050" b="1" dirty="0">
                 <a:solidFill>
                   <a:schemeClr val="accent6">
                     <a:lumMod val="75000"/>
@@ -4176,7 +4160,7 @@
               </a:rPr>
             </a:br>
             <a:r>
-              <a:rPr lang="en-US" sz="1050" b="1" dirty="0" smtClean="0">
+              <a:rPr lang="en-US" sz="1050" b="1" dirty="0">
                 <a:solidFill>
                   <a:schemeClr val="accent6">
                     <a:lumMod val="75000"/>
@@ -4243,7 +4227,7 @@
           <a:p>
             <a:pPr algn="ctr"/>
             <a:r>
-              <a:rPr lang="en-US" sz="1050" dirty="0" smtClean="0">
+              <a:rPr lang="en-US" sz="1050" dirty="0">
                 <a:solidFill>
                   <a:schemeClr val="bg1"/>
                 </a:solidFill>
@@ -4251,14 +4235,14 @@
               <a:t>&lt;&lt;interface&gt;&gt;</a:t>
             </a:r>
             <a:br>
-              <a:rPr lang="en-US" sz="1050" dirty="0" smtClean="0">
+              <a:rPr lang="en-US" sz="1050" dirty="0">
                 <a:solidFill>
                   <a:schemeClr val="bg1"/>
                 </a:solidFill>
               </a:rPr>
             </a:br>
             <a:r>
-              <a:rPr lang="en-US" sz="1050" dirty="0" err="1" smtClean="0">
+              <a:rPr lang="en-US" sz="1050" dirty="0" err="1">
                 <a:solidFill>
                   <a:schemeClr val="bg1"/>
                 </a:solidFill>
@@ -4516,30 +4500,22 @@
           <a:p>
             <a:pPr algn="ctr"/>
             <a:r>
-              <a:rPr lang="en-US" sz="1050" dirty="0" err="1" smtClean="0">
+              <a:rPr lang="en-US" sz="1050" dirty="0" err="1">
                 <a:solidFill>
                   <a:schemeClr val="bg1"/>
                 </a:solidFill>
               </a:rPr>
               <a:t>JsonUserPrefs</a:t>
             </a:r>
-            <a:r>
-              <a:rPr lang="en-US" sz="1050" dirty="0" smtClean="0">
-                <a:solidFill>
-                  <a:schemeClr val="bg1"/>
-                </a:solidFill>
-              </a:rPr>
-              <a:t/>
-            </a:r>
             <a:br>
-              <a:rPr lang="en-US" sz="1050" dirty="0" smtClean="0">
+              <a:rPr lang="en-US" sz="1050" dirty="0">
                 <a:solidFill>
                   <a:schemeClr val="bg1"/>
                 </a:solidFill>
               </a:rPr>
             </a:br>
             <a:r>
-              <a:rPr lang="en-US" sz="1050" dirty="0" smtClean="0">
+              <a:rPr lang="en-US" sz="1050" dirty="0">
                 <a:solidFill>
                   <a:schemeClr val="bg1"/>
                 </a:solidFill>
@@ -4591,7 +4567,7 @@
           <a:p>
             <a:pPr algn="ctr"/>
             <a:r>
-              <a:rPr lang="en-US" sz="1050" b="1" dirty="0" err="1" smtClean="0">
+              <a:rPr lang="en-US" sz="1050" b="1" dirty="0" err="1">
                 <a:solidFill>
                   <a:schemeClr val="accent6">
                     <a:lumMod val="75000"/>
@@ -4600,18 +4576,8 @@
               </a:rPr>
               <a:t>XmlSerializable</a:t>
             </a:r>
-            <a:r>
-              <a:rPr lang="en-US" sz="1050" b="1" dirty="0" smtClean="0">
-                <a:solidFill>
-                  <a:schemeClr val="accent6">
-                    <a:lumMod val="75000"/>
-                  </a:schemeClr>
-                </a:solidFill>
-              </a:rPr>
-              <a:t/>
-            </a:r>
             <a:br>
-              <a:rPr lang="en-US" sz="1050" b="1" dirty="0" smtClean="0">
+              <a:rPr lang="en-US" sz="1050" b="1" dirty="0">
                 <a:solidFill>
                   <a:schemeClr val="accent6">
                     <a:lumMod val="75000"/>
@@ -4620,7 +4586,7 @@
               </a:rPr>
             </a:br>
             <a:r>
-              <a:rPr lang="en-US" sz="1050" b="1" dirty="0" err="1" smtClean="0">
+              <a:rPr lang="en-US" sz="1050" b="1" dirty="0" err="1">
                 <a:solidFill>
                   <a:schemeClr val="accent6">
                     <a:lumMod val="75000"/>
@@ -4717,7 +4683,7 @@
           <a:p>
             <a:pPr algn="ctr"/>
             <a:r>
-              <a:rPr lang="en-US" sz="1050" b="1" dirty="0" err="1" smtClean="0">
+              <a:rPr lang="en-US" sz="1050" b="1" dirty="0" err="1">
                 <a:solidFill>
                   <a:schemeClr val="accent6">
                     <a:lumMod val="75000"/>
@@ -4773,7 +4739,7 @@
           <a:p>
             <a:pPr algn="ctr"/>
             <a:r>
-              <a:rPr lang="en-US" sz="1050" b="1" dirty="0" err="1" smtClean="0">
+              <a:rPr lang="en-US" sz="1050" b="1" dirty="0" err="1">
                 <a:solidFill>
                   <a:schemeClr val="accent6">
                     <a:lumMod val="75000"/>
@@ -4833,6 +4799,393 @@
           </a:fontRef>
         </p:style>
       </p:cxnSp>
+      <p:cxnSp>
+        <p:nvCxnSpPr>
+          <p:cNvPr id="26" name="Straight Arrow Connector 25">
+            <a:extLst>
+              <a:ext uri="{FF2B5EF4-FFF2-40B4-BE49-F238E27FC236}">
+                <a16:creationId xmlns:a16="http://schemas.microsoft.com/office/drawing/2014/main" id="{F8615C77-FB20-497A-A798-0AE0764672B1}"/>
+              </a:ext>
+            </a:extLst>
+          </p:cNvPr>
+          <p:cNvCxnSpPr>
+            <a:stCxn id="27" idx="3"/>
+          </p:cNvCxnSpPr>
+          <p:nvPr/>
+        </p:nvCxnSpPr>
+        <p:spPr>
+          <a:xfrm>
+            <a:off x="2653133" y="2141229"/>
+            <a:ext cx="220810" cy="5284"/>
+          </a:xfrm>
+          <a:prstGeom prst="straightConnector1">
+            <a:avLst/>
+          </a:prstGeom>
+          <a:ln w="19050">
+            <a:solidFill>
+              <a:schemeClr val="accent6">
+                <a:lumMod val="75000"/>
+              </a:schemeClr>
+            </a:solidFill>
+            <a:headEnd type="none" w="med" len="med"/>
+            <a:tailEnd type="arrow" w="med" len="med"/>
+          </a:ln>
+          <a:effectLst/>
+        </p:spPr>
+        <p:style>
+          <a:lnRef idx="1">
+            <a:schemeClr val="accent2"/>
+          </a:lnRef>
+          <a:fillRef idx="2">
+            <a:schemeClr val="accent2"/>
+          </a:fillRef>
+          <a:effectRef idx="1">
+            <a:schemeClr val="accent2"/>
+          </a:effectRef>
+          <a:fontRef idx="minor">
+            <a:schemeClr val="dk1"/>
+          </a:fontRef>
+        </p:style>
+      </p:cxnSp>
+      <p:sp>
+        <p:nvSpPr>
+          <p:cNvPr id="27" name="Flowchart: Decision 96">
+            <a:extLst>
+              <a:ext uri="{FF2B5EF4-FFF2-40B4-BE49-F238E27FC236}">
+                <a16:creationId xmlns:a16="http://schemas.microsoft.com/office/drawing/2014/main" id="{941E38F7-AE34-465B-A133-CD8BBF5EA823}"/>
+              </a:ext>
+            </a:extLst>
+          </p:cNvPr>
+          <p:cNvSpPr/>
+          <p:nvPr/>
+        </p:nvSpPr>
+        <p:spPr>
+          <a:xfrm>
+            <a:off x="2417085" y="2054539"/>
+            <a:ext cx="236048" cy="173380"/>
+          </a:xfrm>
+          <a:prstGeom prst="flowChartDecision">
+            <a:avLst/>
+          </a:prstGeom>
+          <a:noFill/>
+          <a:ln w="19050">
+            <a:solidFill>
+              <a:schemeClr val="accent6">
+                <a:lumMod val="75000"/>
+              </a:schemeClr>
+            </a:solidFill>
+          </a:ln>
+          <a:effectLst/>
+        </p:spPr>
+        <p:style>
+          <a:lnRef idx="1">
+            <a:schemeClr val="accent2"/>
+          </a:lnRef>
+          <a:fillRef idx="2">
+            <a:schemeClr val="accent2"/>
+          </a:fillRef>
+          <a:effectRef idx="1">
+            <a:schemeClr val="accent2"/>
+          </a:effectRef>
+          <a:fontRef idx="minor">
+            <a:schemeClr val="dk1"/>
+          </a:fontRef>
+        </p:style>
+        <p:txBody>
+          <a:bodyPr rtlCol="0" anchor="ctr"/>
+          <a:lstStyle/>
+          <a:p>
+            <a:pPr algn="ctr"/>
+            <a:endParaRPr lang="en-US" sz="1050">
+              <a:solidFill>
+                <a:schemeClr val="bg1"/>
+              </a:solidFill>
+            </a:endParaRPr>
+          </a:p>
+        </p:txBody>
+      </p:sp>
+      <p:sp>
+        <p:nvSpPr>
+          <p:cNvPr id="30" name="Rectangle 8">
+            <a:extLst>
+              <a:ext uri="{FF2B5EF4-FFF2-40B4-BE49-F238E27FC236}">
+                <a16:creationId xmlns:a16="http://schemas.microsoft.com/office/drawing/2014/main" id="{B187EB57-AC31-4BED-BFDA-43788F9DC338}"/>
+              </a:ext>
+            </a:extLst>
+          </p:cNvPr>
+          <p:cNvSpPr/>
+          <p:nvPr/>
+        </p:nvSpPr>
+        <p:spPr>
+          <a:xfrm>
+            <a:off x="2881808" y="1962924"/>
+            <a:ext cx="1323049" cy="346760"/>
+          </a:xfrm>
+          <a:prstGeom prst="rect">
+            <a:avLst/>
+          </a:prstGeom>
+          <a:solidFill>
+            <a:schemeClr val="accent6">
+              <a:lumMod val="75000"/>
+            </a:schemeClr>
+          </a:solidFill>
+          <a:ln w="19050">
+            <a:solidFill>
+              <a:schemeClr val="accent6">
+                <a:lumMod val="75000"/>
+              </a:schemeClr>
+            </a:solidFill>
+          </a:ln>
+          <a:effectLst/>
+        </p:spPr>
+        <p:style>
+          <a:lnRef idx="1">
+            <a:schemeClr val="accent2"/>
+          </a:lnRef>
+          <a:fillRef idx="2">
+            <a:schemeClr val="accent2"/>
+          </a:fillRef>
+          <a:effectRef idx="1">
+            <a:schemeClr val="accent2"/>
+          </a:effectRef>
+          <a:fontRef idx="minor">
+            <a:schemeClr val="dk1"/>
+          </a:fontRef>
+        </p:style>
+        <p:txBody>
+          <a:bodyPr rtlCol="0" anchor="ctr"/>
+          <a:lstStyle/>
+          <a:p>
+            <a:pPr algn="ctr"/>
+            <a:r>
+              <a:rPr lang="en-US" sz="1050" dirty="0">
+                <a:solidFill>
+                  <a:schemeClr val="bg1"/>
+                </a:solidFill>
+              </a:rPr>
+              <a:t>&lt;&lt;interface&gt;&gt;</a:t>
+            </a:r>
+            <a:br>
+              <a:rPr lang="en-US" sz="1050" dirty="0">
+                <a:solidFill>
+                  <a:schemeClr val="bg1"/>
+                </a:solidFill>
+              </a:rPr>
+            </a:br>
+            <a:r>
+              <a:rPr lang="en-US" sz="1050" dirty="0" err="1">
+                <a:solidFill>
+                  <a:schemeClr val="bg1"/>
+                </a:solidFill>
+              </a:rPr>
+              <a:t>TimeTableStorage</a:t>
+            </a:r>
+            <a:endParaRPr lang="en-SG" sz="1050" dirty="0">
+              <a:solidFill>
+                <a:schemeClr val="bg1"/>
+              </a:solidFill>
+            </a:endParaRPr>
+          </a:p>
+        </p:txBody>
+      </p:sp>
+      <p:cxnSp>
+        <p:nvCxnSpPr>
+          <p:cNvPr id="31" name="Elbow Connector 63">
+            <a:extLst>
+              <a:ext uri="{FF2B5EF4-FFF2-40B4-BE49-F238E27FC236}">
+                <a16:creationId xmlns:a16="http://schemas.microsoft.com/office/drawing/2014/main" id="{7704716A-3AB7-474A-B186-72C8FEA7A4E4}"/>
+              </a:ext>
+            </a:extLst>
+          </p:cNvPr>
+          <p:cNvCxnSpPr>
+            <a:stCxn id="32" idx="3"/>
+            <a:endCxn id="33" idx="1"/>
+          </p:cNvCxnSpPr>
+          <p:nvPr/>
+        </p:nvCxnSpPr>
+        <p:spPr>
+          <a:xfrm flipV="1">
+            <a:off x="4384830" y="2149258"/>
+            <a:ext cx="223324" cy="1"/>
+          </a:xfrm>
+          <a:prstGeom prst="bentConnector3">
+            <a:avLst>
+              <a:gd name="adj1" fmla="val 50000"/>
+            </a:avLst>
+          </a:prstGeom>
+          <a:ln w="19050">
+            <a:solidFill>
+              <a:schemeClr val="accent6">
+                <a:lumMod val="75000"/>
+              </a:schemeClr>
+            </a:solidFill>
+            <a:prstDash val="sysDot"/>
+            <a:headEnd type="none" w="med" len="med"/>
+            <a:tailEnd type="none" w="med" len="med"/>
+          </a:ln>
+          <a:effectLst/>
+        </p:spPr>
+        <p:style>
+          <a:lnRef idx="1">
+            <a:schemeClr val="accent2"/>
+          </a:lnRef>
+          <a:fillRef idx="2">
+            <a:schemeClr val="accent2"/>
+          </a:fillRef>
+          <a:effectRef idx="1">
+            <a:schemeClr val="accent2"/>
+          </a:effectRef>
+          <a:fontRef idx="minor">
+            <a:schemeClr val="dk1"/>
+          </a:fontRef>
+        </p:style>
+      </p:cxnSp>
+      <p:sp>
+        <p:nvSpPr>
+          <p:cNvPr id="32" name="Isosceles Triangle 102">
+            <a:extLst>
+              <a:ext uri="{FF2B5EF4-FFF2-40B4-BE49-F238E27FC236}">
+                <a16:creationId xmlns:a16="http://schemas.microsoft.com/office/drawing/2014/main" id="{BD35A4B0-C4C5-43C7-B4B8-9C039B788083}"/>
+              </a:ext>
+            </a:extLst>
+          </p:cNvPr>
+          <p:cNvSpPr/>
+          <p:nvPr/>
+        </p:nvSpPr>
+        <p:spPr>
+          <a:xfrm rot="5400000" flipV="1">
+            <a:off x="4161816" y="2061497"/>
+            <a:ext cx="270504" cy="175523"/>
+          </a:xfrm>
+          <a:prstGeom prst="triangle">
+            <a:avLst/>
+          </a:prstGeom>
+          <a:solidFill>
+            <a:schemeClr val="accent6">
+              <a:lumMod val="75000"/>
+            </a:schemeClr>
+          </a:solidFill>
+          <a:ln w="19050">
+            <a:solidFill>
+              <a:schemeClr val="accent6">
+                <a:lumMod val="75000"/>
+              </a:schemeClr>
+            </a:solidFill>
+          </a:ln>
+          <a:effectLst/>
+        </p:spPr>
+        <p:style>
+          <a:lnRef idx="1">
+            <a:schemeClr val="accent2"/>
+          </a:lnRef>
+          <a:fillRef idx="2">
+            <a:schemeClr val="accent2"/>
+          </a:fillRef>
+          <a:effectRef idx="1">
+            <a:schemeClr val="accent2"/>
+          </a:effectRef>
+          <a:fontRef idx="minor">
+            <a:schemeClr val="dk1"/>
+          </a:fontRef>
+        </p:style>
+        <p:txBody>
+          <a:bodyPr rtlCol="0" anchor="ctr"/>
+          <a:lstStyle/>
+          <a:p>
+            <a:pPr algn="ctr"/>
+            <a:endParaRPr lang="en-SG" sz="1050">
+              <a:solidFill>
+                <a:schemeClr val="bg1"/>
+              </a:solidFill>
+            </a:endParaRPr>
+          </a:p>
+        </p:txBody>
+      </p:sp>
+      <p:sp>
+        <p:nvSpPr>
+          <p:cNvPr id="33" name="Rectangle 8">
+            <a:extLst>
+              <a:ext uri="{FF2B5EF4-FFF2-40B4-BE49-F238E27FC236}">
+                <a16:creationId xmlns:a16="http://schemas.microsoft.com/office/drawing/2014/main" id="{0D3B7B7D-A351-464A-A2C1-6B36E0BC0B6A}"/>
+              </a:ext>
+            </a:extLst>
+          </p:cNvPr>
+          <p:cNvSpPr/>
+          <p:nvPr/>
+        </p:nvSpPr>
+        <p:spPr>
+          <a:xfrm>
+            <a:off x="4608154" y="1975878"/>
+            <a:ext cx="1093635" cy="346760"/>
+          </a:xfrm>
+          <a:prstGeom prst="rect">
+            <a:avLst/>
+          </a:prstGeom>
+          <a:solidFill>
+            <a:schemeClr val="accent6">
+              <a:lumMod val="75000"/>
+            </a:schemeClr>
+          </a:solidFill>
+          <a:ln w="19050">
+            <a:solidFill>
+              <a:schemeClr val="accent6">
+                <a:lumMod val="75000"/>
+              </a:schemeClr>
+            </a:solidFill>
+          </a:ln>
+          <a:effectLst/>
+        </p:spPr>
+        <p:style>
+          <a:lnRef idx="1">
+            <a:schemeClr val="accent2"/>
+          </a:lnRef>
+          <a:fillRef idx="2">
+            <a:schemeClr val="accent2"/>
+          </a:fillRef>
+          <a:effectRef idx="1">
+            <a:schemeClr val="accent2"/>
+          </a:effectRef>
+          <a:fontRef idx="minor">
+            <a:schemeClr val="dk1"/>
+          </a:fontRef>
+        </p:style>
+        <p:txBody>
+          <a:bodyPr rtlCol="0" anchor="ctr"/>
+          <a:lstStyle/>
+          <a:p>
+            <a:pPr algn="ctr"/>
+            <a:r>
+              <a:rPr lang="en-US" sz="1050" dirty="0" err="1">
+                <a:solidFill>
+                  <a:schemeClr val="bg1"/>
+                </a:solidFill>
+              </a:rPr>
+              <a:t>TimeTable</a:t>
+            </a:r>
+            <a:endParaRPr lang="en-US" sz="1050" dirty="0">
+              <a:solidFill>
+                <a:schemeClr val="bg1"/>
+              </a:solidFill>
+            </a:endParaRPr>
+          </a:p>
+          <a:p>
+            <a:pPr algn="ctr"/>
+            <a:r>
+              <a:rPr lang="en-US" sz="1050" dirty="0">
+                <a:solidFill>
+                  <a:schemeClr val="bg1"/>
+                </a:solidFill>
+              </a:rPr>
+              <a:t>Storage</a:t>
+            </a:r>
+            <a:endParaRPr lang="en-SG" sz="1050" dirty="0">
+              <a:solidFill>
+                <a:schemeClr val="bg1"/>
+              </a:solidFill>
+            </a:endParaRPr>
+          </a:p>
+        </p:txBody>
+      </p:sp>
     </p:spTree>
     <p:extLst>
       <p:ext uri="{BB962C8B-B14F-4D97-AF65-F5344CB8AC3E}">
@@ -4843,13 +5196,6 @@
   <p:clrMapOvr>
     <a:masterClrMapping/>
   </p:clrMapOvr>
-  <p:timing>
-    <p:tnLst>
-      <p:par>
-        <p:cTn id="1" dur="indefinite" restart="never" nodeType="tmRoot"/>
-      </p:par>
-    </p:tnLst>
-  </p:timing>
 </p:sld>
 </file>
 

</xml_diff>

<commit_message>
Update Storage Class Diagram in dev guide
. Include XMLAdaptedGroup
</commit_message>
<xml_diff>
--- a/docs/diagrams/StorageComponentClassDiagram.pptx
+++ b/docs/diagrams/StorageComponentClassDiagram.pptx
@@ -107,6 +107,22 @@
       </a:defRPr>
     </a:lvl9pPr>
   </p:defaultTextStyle>
+  <p:extLst>
+    <p:ext uri="{EFAFB233-063F-42B5-8137-9DF3F51BA10A}">
+      <p15:sldGuideLst xmlns:p15="http://schemas.microsoft.com/office/powerpoint/2012/main">
+        <p15:guide id="1" orient="horz" pos="1488">
+          <p15:clr>
+            <a:srgbClr val="A4A3A4"/>
+          </p15:clr>
+        </p15:guide>
+        <p15:guide id="2" pos="2880">
+          <p15:clr>
+            <a:srgbClr val="A4A3A4"/>
+          </p15:clr>
+        </p15:guide>
+      </p15:sldGuideLst>
+    </p:ext>
+  </p:extLst>
 </p:presentation>
 </file>
 
@@ -192,7 +208,7 @@
           <a:p>
             <a:fld id="{F5CC4B3F-88C1-4FFA-B1B6-F41C21DC6924}" type="datetimeFigureOut">
               <a:rPr lang="en-US" smtClean="0"/>
-              <a:t>10/16/2016</a:t>
+              <a:t>10/29/2018</a:t>
             </a:fld>
             <a:endParaRPr lang="en-US"/>
           </a:p>
@@ -256,38 +272,37 @@
           <a:p>
             <a:pPr lvl="0"/>
             <a:r>
-              <a:rPr lang="en-US" smtClean="0"/>
+              <a:rPr lang="en-US"/>
               <a:t>Click to edit Master text styles</a:t>
             </a:r>
           </a:p>
           <a:p>
             <a:pPr lvl="1"/>
             <a:r>
-              <a:rPr lang="en-US" smtClean="0"/>
+              <a:rPr lang="en-US"/>
               <a:t>Second level</a:t>
             </a:r>
           </a:p>
           <a:p>
             <a:pPr lvl="2"/>
             <a:r>
-              <a:rPr lang="en-US" smtClean="0"/>
+              <a:rPr lang="en-US"/>
               <a:t>Third level</a:t>
             </a:r>
           </a:p>
           <a:p>
             <a:pPr lvl="3"/>
             <a:r>
-              <a:rPr lang="en-US" smtClean="0"/>
+              <a:rPr lang="en-US"/>
               <a:t>Fourth level</a:t>
             </a:r>
           </a:p>
           <a:p>
             <a:pPr lvl="4"/>
             <a:r>
-              <a:rPr lang="en-US" smtClean="0"/>
+              <a:rPr lang="en-US"/>
               <a:t>Fifth level</a:t>
             </a:r>
-            <a:endParaRPr lang="en-US"/>
           </a:p>
         </p:txBody>
       </p:sp>
@@ -498,10 +513,9 @@
           <a:lstStyle/>
           <a:p>
             <a:r>
-              <a:rPr lang="en-US" smtClean="0"/>
+              <a:rPr lang="en-US"/>
               <a:t>Click to edit Master title style</a:t>
             </a:r>
-            <a:endParaRPr lang="en-US"/>
           </a:p>
         </p:txBody>
       </p:sp>
@@ -617,10 +631,9 @@
           </a:lstStyle>
           <a:p>
             <a:r>
-              <a:rPr lang="en-US" smtClean="0"/>
+              <a:rPr lang="en-US"/>
               <a:t>Click to edit Master subtitle style</a:t>
             </a:r>
-            <a:endParaRPr lang="en-US"/>
           </a:p>
         </p:txBody>
       </p:sp>
@@ -641,7 +654,7 @@
           <a:p>
             <a:fld id="{78C97017-6FC3-485B-9764-EAC9E56C1D49}" type="datetimeFigureOut">
               <a:rPr lang="en-US" smtClean="0"/>
-              <a:t>10/16/2016</a:t>
+              <a:t>10/29/2018</a:t>
             </a:fld>
             <a:endParaRPr lang="en-US"/>
           </a:p>
@@ -735,10 +748,9 @@
           <a:lstStyle/>
           <a:p>
             <a:r>
-              <a:rPr lang="en-US" smtClean="0"/>
+              <a:rPr lang="en-US"/>
               <a:t>Click to edit Master title style</a:t>
             </a:r>
-            <a:endParaRPr lang="en-US"/>
           </a:p>
         </p:txBody>
       </p:sp>
@@ -759,38 +771,37 @@
           <a:p>
             <a:pPr lvl="0"/>
             <a:r>
-              <a:rPr lang="en-US" smtClean="0"/>
+              <a:rPr lang="en-US"/>
               <a:t>Click to edit Master text styles</a:t>
             </a:r>
           </a:p>
           <a:p>
             <a:pPr lvl="1"/>
             <a:r>
-              <a:rPr lang="en-US" smtClean="0"/>
+              <a:rPr lang="en-US"/>
               <a:t>Second level</a:t>
             </a:r>
           </a:p>
           <a:p>
             <a:pPr lvl="2"/>
             <a:r>
-              <a:rPr lang="en-US" smtClean="0"/>
+              <a:rPr lang="en-US"/>
               <a:t>Third level</a:t>
             </a:r>
           </a:p>
           <a:p>
             <a:pPr lvl="3"/>
             <a:r>
-              <a:rPr lang="en-US" smtClean="0"/>
+              <a:rPr lang="en-US"/>
               <a:t>Fourth level</a:t>
             </a:r>
           </a:p>
           <a:p>
             <a:pPr lvl="4"/>
             <a:r>
-              <a:rPr lang="en-US" smtClean="0"/>
+              <a:rPr lang="en-US"/>
               <a:t>Fifth level</a:t>
             </a:r>
-            <a:endParaRPr lang="en-US"/>
           </a:p>
         </p:txBody>
       </p:sp>
@@ -811,7 +822,7 @@
           <a:p>
             <a:fld id="{78C97017-6FC3-485B-9764-EAC9E56C1D49}" type="datetimeFigureOut">
               <a:rPr lang="en-US" smtClean="0"/>
-              <a:t>10/16/2016</a:t>
+              <a:t>10/29/2018</a:t>
             </a:fld>
             <a:endParaRPr lang="en-US"/>
           </a:p>
@@ -910,10 +921,9 @@
           <a:lstStyle/>
           <a:p>
             <a:r>
-              <a:rPr lang="en-US" smtClean="0"/>
+              <a:rPr lang="en-US"/>
               <a:t>Click to edit Master title style</a:t>
             </a:r>
-            <a:endParaRPr lang="en-US"/>
           </a:p>
         </p:txBody>
       </p:sp>
@@ -939,38 +949,37 @@
           <a:p>
             <a:pPr lvl="0"/>
             <a:r>
-              <a:rPr lang="en-US" smtClean="0"/>
+              <a:rPr lang="en-US"/>
               <a:t>Click to edit Master text styles</a:t>
             </a:r>
           </a:p>
           <a:p>
             <a:pPr lvl="1"/>
             <a:r>
-              <a:rPr lang="en-US" smtClean="0"/>
+              <a:rPr lang="en-US"/>
               <a:t>Second level</a:t>
             </a:r>
           </a:p>
           <a:p>
             <a:pPr lvl="2"/>
             <a:r>
-              <a:rPr lang="en-US" smtClean="0"/>
+              <a:rPr lang="en-US"/>
               <a:t>Third level</a:t>
             </a:r>
           </a:p>
           <a:p>
             <a:pPr lvl="3"/>
             <a:r>
-              <a:rPr lang="en-US" smtClean="0"/>
+              <a:rPr lang="en-US"/>
               <a:t>Fourth level</a:t>
             </a:r>
           </a:p>
           <a:p>
             <a:pPr lvl="4"/>
             <a:r>
-              <a:rPr lang="en-US" smtClean="0"/>
+              <a:rPr lang="en-US"/>
               <a:t>Fifth level</a:t>
             </a:r>
-            <a:endParaRPr lang="en-US"/>
           </a:p>
         </p:txBody>
       </p:sp>
@@ -991,7 +1000,7 @@
           <a:p>
             <a:fld id="{78C97017-6FC3-485B-9764-EAC9E56C1D49}" type="datetimeFigureOut">
               <a:rPr lang="en-US" smtClean="0"/>
-              <a:t>10/16/2016</a:t>
+              <a:t>10/29/2018</a:t>
             </a:fld>
             <a:endParaRPr lang="en-US"/>
           </a:p>
@@ -1085,10 +1094,9 @@
           <a:lstStyle/>
           <a:p>
             <a:r>
-              <a:rPr lang="en-US" smtClean="0"/>
+              <a:rPr lang="en-US"/>
               <a:t>Click to edit Master title style</a:t>
             </a:r>
-            <a:endParaRPr lang="en-US"/>
           </a:p>
         </p:txBody>
       </p:sp>
@@ -1109,38 +1117,37 @@
           <a:p>
             <a:pPr lvl="0"/>
             <a:r>
-              <a:rPr lang="en-US" smtClean="0"/>
+              <a:rPr lang="en-US"/>
               <a:t>Click to edit Master text styles</a:t>
             </a:r>
           </a:p>
           <a:p>
             <a:pPr lvl="1"/>
             <a:r>
-              <a:rPr lang="en-US" smtClean="0"/>
+              <a:rPr lang="en-US"/>
               <a:t>Second level</a:t>
             </a:r>
           </a:p>
           <a:p>
             <a:pPr lvl="2"/>
             <a:r>
-              <a:rPr lang="en-US" smtClean="0"/>
+              <a:rPr lang="en-US"/>
               <a:t>Third level</a:t>
             </a:r>
           </a:p>
           <a:p>
             <a:pPr lvl="3"/>
             <a:r>
-              <a:rPr lang="en-US" smtClean="0"/>
+              <a:rPr lang="en-US"/>
               <a:t>Fourth level</a:t>
             </a:r>
           </a:p>
           <a:p>
             <a:pPr lvl="4"/>
             <a:r>
-              <a:rPr lang="en-US" smtClean="0"/>
+              <a:rPr lang="en-US"/>
               <a:t>Fifth level</a:t>
             </a:r>
-            <a:endParaRPr lang="en-US"/>
           </a:p>
         </p:txBody>
       </p:sp>
@@ -1161,7 +1168,7 @@
           <a:p>
             <a:fld id="{78C97017-6FC3-485B-9764-EAC9E56C1D49}" type="datetimeFigureOut">
               <a:rPr lang="en-US" smtClean="0"/>
-              <a:t>10/16/2016</a:t>
+              <a:t>10/29/2018</a:t>
             </a:fld>
             <a:endParaRPr lang="en-US"/>
           </a:p>
@@ -1264,10 +1271,9 @@
           </a:lstStyle>
           <a:p>
             <a:r>
-              <a:rPr lang="en-US" smtClean="0"/>
+              <a:rPr lang="en-US"/>
               <a:t>Click to edit Master title style</a:t>
             </a:r>
-            <a:endParaRPr lang="en-US"/>
           </a:p>
         </p:txBody>
       </p:sp>
@@ -1384,7 +1390,7 @@
           <a:p>
             <a:pPr lvl="0"/>
             <a:r>
-              <a:rPr lang="en-US" smtClean="0"/>
+              <a:rPr lang="en-US"/>
               <a:t>Click to edit Master text styles</a:t>
             </a:r>
           </a:p>
@@ -1407,7 +1413,7 @@
           <a:p>
             <a:fld id="{78C97017-6FC3-485B-9764-EAC9E56C1D49}" type="datetimeFigureOut">
               <a:rPr lang="en-US" smtClean="0"/>
-              <a:t>10/16/2016</a:t>
+              <a:t>10/29/2018</a:t>
             </a:fld>
             <a:endParaRPr lang="en-US"/>
           </a:p>
@@ -1501,10 +1507,9 @@
           <a:lstStyle/>
           <a:p>
             <a:r>
-              <a:rPr lang="en-US" smtClean="0"/>
+              <a:rPr lang="en-US"/>
               <a:t>Click to edit Master title style</a:t>
             </a:r>
-            <a:endParaRPr lang="en-US"/>
           </a:p>
         </p:txBody>
       </p:sp>
@@ -1558,38 +1563,37 @@
           <a:p>
             <a:pPr lvl="0"/>
             <a:r>
-              <a:rPr lang="en-US" smtClean="0"/>
+              <a:rPr lang="en-US"/>
               <a:t>Click to edit Master text styles</a:t>
             </a:r>
           </a:p>
           <a:p>
             <a:pPr lvl="1"/>
             <a:r>
-              <a:rPr lang="en-US" smtClean="0"/>
+              <a:rPr lang="en-US"/>
               <a:t>Second level</a:t>
             </a:r>
           </a:p>
           <a:p>
             <a:pPr lvl="2"/>
             <a:r>
-              <a:rPr lang="en-US" smtClean="0"/>
+              <a:rPr lang="en-US"/>
               <a:t>Third level</a:t>
             </a:r>
           </a:p>
           <a:p>
             <a:pPr lvl="3"/>
             <a:r>
-              <a:rPr lang="en-US" smtClean="0"/>
+              <a:rPr lang="en-US"/>
               <a:t>Fourth level</a:t>
             </a:r>
           </a:p>
           <a:p>
             <a:pPr lvl="4"/>
             <a:r>
-              <a:rPr lang="en-US" smtClean="0"/>
+              <a:rPr lang="en-US"/>
               <a:t>Fifth level</a:t>
             </a:r>
-            <a:endParaRPr lang="en-US"/>
           </a:p>
         </p:txBody>
       </p:sp>
@@ -1643,38 +1647,37 @@
           <a:p>
             <a:pPr lvl="0"/>
             <a:r>
-              <a:rPr lang="en-US" smtClean="0"/>
+              <a:rPr lang="en-US"/>
               <a:t>Click to edit Master text styles</a:t>
             </a:r>
           </a:p>
           <a:p>
             <a:pPr lvl="1"/>
             <a:r>
-              <a:rPr lang="en-US" smtClean="0"/>
+              <a:rPr lang="en-US"/>
               <a:t>Second level</a:t>
             </a:r>
           </a:p>
           <a:p>
             <a:pPr lvl="2"/>
             <a:r>
-              <a:rPr lang="en-US" smtClean="0"/>
+              <a:rPr lang="en-US"/>
               <a:t>Third level</a:t>
             </a:r>
           </a:p>
           <a:p>
             <a:pPr lvl="3"/>
             <a:r>
-              <a:rPr lang="en-US" smtClean="0"/>
+              <a:rPr lang="en-US"/>
               <a:t>Fourth level</a:t>
             </a:r>
           </a:p>
           <a:p>
             <a:pPr lvl="4"/>
             <a:r>
-              <a:rPr lang="en-US" smtClean="0"/>
+              <a:rPr lang="en-US"/>
               <a:t>Fifth level</a:t>
             </a:r>
-            <a:endParaRPr lang="en-US"/>
           </a:p>
         </p:txBody>
       </p:sp>
@@ -1695,7 +1698,7 @@
           <a:p>
             <a:fld id="{78C97017-6FC3-485B-9764-EAC9E56C1D49}" type="datetimeFigureOut">
               <a:rPr lang="en-US" smtClean="0"/>
-              <a:t>10/16/2016</a:t>
+              <a:t>10/29/2018</a:t>
             </a:fld>
             <a:endParaRPr lang="en-US"/>
           </a:p>
@@ -1793,10 +1796,9 @@
           </a:lstStyle>
           <a:p>
             <a:r>
-              <a:rPr lang="en-US" smtClean="0"/>
+              <a:rPr lang="en-US"/>
               <a:t>Click to edit Master title style</a:t>
             </a:r>
-            <a:endParaRPr lang="en-US"/>
           </a:p>
         </p:txBody>
       </p:sp>
@@ -1859,7 +1861,7 @@
           <a:p>
             <a:pPr lvl="0"/>
             <a:r>
-              <a:rPr lang="en-US" smtClean="0"/>
+              <a:rPr lang="en-US"/>
               <a:t>Click to edit Master text styles</a:t>
             </a:r>
           </a:p>
@@ -1915,38 +1917,37 @@
           <a:p>
             <a:pPr lvl="0"/>
             <a:r>
-              <a:rPr lang="en-US" smtClean="0"/>
+              <a:rPr lang="en-US"/>
               <a:t>Click to edit Master text styles</a:t>
             </a:r>
           </a:p>
           <a:p>
             <a:pPr lvl="1"/>
             <a:r>
-              <a:rPr lang="en-US" smtClean="0"/>
+              <a:rPr lang="en-US"/>
               <a:t>Second level</a:t>
             </a:r>
           </a:p>
           <a:p>
             <a:pPr lvl="2"/>
             <a:r>
-              <a:rPr lang="en-US" smtClean="0"/>
+              <a:rPr lang="en-US"/>
               <a:t>Third level</a:t>
             </a:r>
           </a:p>
           <a:p>
             <a:pPr lvl="3"/>
             <a:r>
-              <a:rPr lang="en-US" smtClean="0"/>
+              <a:rPr lang="en-US"/>
               <a:t>Fourth level</a:t>
             </a:r>
           </a:p>
           <a:p>
             <a:pPr lvl="4"/>
             <a:r>
-              <a:rPr lang="en-US" smtClean="0"/>
+              <a:rPr lang="en-US"/>
               <a:t>Fifth level</a:t>
             </a:r>
-            <a:endParaRPr lang="en-US"/>
           </a:p>
         </p:txBody>
       </p:sp>
@@ -2009,7 +2010,7 @@
           <a:p>
             <a:pPr lvl="0"/>
             <a:r>
-              <a:rPr lang="en-US" smtClean="0"/>
+              <a:rPr lang="en-US"/>
               <a:t>Click to edit Master text styles</a:t>
             </a:r>
           </a:p>
@@ -2065,38 +2066,37 @@
           <a:p>
             <a:pPr lvl="0"/>
             <a:r>
-              <a:rPr lang="en-US" smtClean="0"/>
+              <a:rPr lang="en-US"/>
               <a:t>Click to edit Master text styles</a:t>
             </a:r>
           </a:p>
           <a:p>
             <a:pPr lvl="1"/>
             <a:r>
-              <a:rPr lang="en-US" smtClean="0"/>
+              <a:rPr lang="en-US"/>
               <a:t>Second level</a:t>
             </a:r>
           </a:p>
           <a:p>
             <a:pPr lvl="2"/>
             <a:r>
-              <a:rPr lang="en-US" smtClean="0"/>
+              <a:rPr lang="en-US"/>
               <a:t>Third level</a:t>
             </a:r>
           </a:p>
           <a:p>
             <a:pPr lvl="3"/>
             <a:r>
-              <a:rPr lang="en-US" smtClean="0"/>
+              <a:rPr lang="en-US"/>
               <a:t>Fourth level</a:t>
             </a:r>
           </a:p>
           <a:p>
             <a:pPr lvl="4"/>
             <a:r>
-              <a:rPr lang="en-US" smtClean="0"/>
+              <a:rPr lang="en-US"/>
               <a:t>Fifth level</a:t>
             </a:r>
-            <a:endParaRPr lang="en-US"/>
           </a:p>
         </p:txBody>
       </p:sp>
@@ -2117,7 +2117,7 @@
           <a:p>
             <a:fld id="{78C97017-6FC3-485B-9764-EAC9E56C1D49}" type="datetimeFigureOut">
               <a:rPr lang="en-US" smtClean="0"/>
-              <a:t>10/16/2016</a:t>
+              <a:t>10/29/2018</a:t>
             </a:fld>
             <a:endParaRPr lang="en-US"/>
           </a:p>
@@ -2211,10 +2211,9 @@
           <a:lstStyle/>
           <a:p>
             <a:r>
-              <a:rPr lang="en-US" smtClean="0"/>
+              <a:rPr lang="en-US"/>
               <a:t>Click to edit Master title style</a:t>
             </a:r>
-            <a:endParaRPr lang="en-US"/>
           </a:p>
         </p:txBody>
       </p:sp>
@@ -2235,7 +2234,7 @@
           <a:p>
             <a:fld id="{78C97017-6FC3-485B-9764-EAC9E56C1D49}" type="datetimeFigureOut">
               <a:rPr lang="en-US" smtClean="0"/>
-              <a:t>10/16/2016</a:t>
+              <a:t>10/29/2018</a:t>
             </a:fld>
             <a:endParaRPr lang="en-US"/>
           </a:p>
@@ -2330,7 +2329,7 @@
           <a:p>
             <a:fld id="{78C97017-6FC3-485B-9764-EAC9E56C1D49}" type="datetimeFigureOut">
               <a:rPr lang="en-US" smtClean="0"/>
-              <a:t>10/16/2016</a:t>
+              <a:t>10/29/2018</a:t>
             </a:fld>
             <a:endParaRPr lang="en-US"/>
           </a:p>
@@ -2433,10 +2432,9 @@
           </a:lstStyle>
           <a:p>
             <a:r>
-              <a:rPr lang="en-US" smtClean="0"/>
+              <a:rPr lang="en-US"/>
               <a:t>Click to edit Master title style</a:t>
             </a:r>
-            <a:endParaRPr lang="en-US"/>
           </a:p>
         </p:txBody>
       </p:sp>
@@ -2490,38 +2488,37 @@
           <a:p>
             <a:pPr lvl="0"/>
             <a:r>
-              <a:rPr lang="en-US" smtClean="0"/>
+              <a:rPr lang="en-US"/>
               <a:t>Click to edit Master text styles</a:t>
             </a:r>
           </a:p>
           <a:p>
             <a:pPr lvl="1"/>
             <a:r>
-              <a:rPr lang="en-US" smtClean="0"/>
+              <a:rPr lang="en-US"/>
               <a:t>Second level</a:t>
             </a:r>
           </a:p>
           <a:p>
             <a:pPr lvl="2"/>
             <a:r>
-              <a:rPr lang="en-US" smtClean="0"/>
+              <a:rPr lang="en-US"/>
               <a:t>Third level</a:t>
             </a:r>
           </a:p>
           <a:p>
             <a:pPr lvl="3"/>
             <a:r>
-              <a:rPr lang="en-US" smtClean="0"/>
+              <a:rPr lang="en-US"/>
               <a:t>Fourth level</a:t>
             </a:r>
           </a:p>
           <a:p>
             <a:pPr lvl="4"/>
             <a:r>
-              <a:rPr lang="en-US" smtClean="0"/>
+              <a:rPr lang="en-US"/>
               <a:t>Fifth level</a:t>
             </a:r>
-            <a:endParaRPr lang="en-US"/>
           </a:p>
         </p:txBody>
       </p:sp>
@@ -2584,7 +2581,7 @@
           <a:p>
             <a:pPr lvl="0"/>
             <a:r>
-              <a:rPr lang="en-US" smtClean="0"/>
+              <a:rPr lang="en-US"/>
               <a:t>Click to edit Master text styles</a:t>
             </a:r>
           </a:p>
@@ -2607,7 +2604,7 @@
           <a:p>
             <a:fld id="{78C97017-6FC3-485B-9764-EAC9E56C1D49}" type="datetimeFigureOut">
               <a:rPr lang="en-US" smtClean="0"/>
-              <a:t>10/16/2016</a:t>
+              <a:t>10/29/2018</a:t>
             </a:fld>
             <a:endParaRPr lang="en-US"/>
           </a:p>
@@ -2710,10 +2707,9 @@
           </a:lstStyle>
           <a:p>
             <a:r>
-              <a:rPr lang="en-US" smtClean="0"/>
+              <a:rPr lang="en-US"/>
               <a:t>Click to edit Master title style</a:t>
             </a:r>
-            <a:endParaRPr lang="en-US"/>
           </a:p>
         </p:txBody>
       </p:sp>
@@ -2837,7 +2833,7 @@
           <a:p>
             <a:pPr lvl="0"/>
             <a:r>
-              <a:rPr lang="en-US" smtClean="0"/>
+              <a:rPr lang="en-US"/>
               <a:t>Click to edit Master text styles</a:t>
             </a:r>
           </a:p>
@@ -2860,7 +2856,7 @@
           <a:p>
             <a:fld id="{78C97017-6FC3-485B-9764-EAC9E56C1D49}" type="datetimeFigureOut">
               <a:rPr lang="en-US" smtClean="0"/>
-              <a:t>10/16/2016</a:t>
+              <a:t>10/29/2018</a:t>
             </a:fld>
             <a:endParaRPr lang="en-US"/>
           </a:p>
@@ -2969,10 +2965,9 @@
           <a:lstStyle/>
           <a:p>
             <a:r>
-              <a:rPr lang="en-US" smtClean="0"/>
+              <a:rPr lang="en-US"/>
               <a:t>Click to edit Master title style</a:t>
             </a:r>
-            <a:endParaRPr lang="en-US"/>
           </a:p>
         </p:txBody>
       </p:sp>
@@ -3003,38 +2998,37 @@
           <a:p>
             <a:pPr lvl="0"/>
             <a:r>
-              <a:rPr lang="en-US" smtClean="0"/>
+              <a:rPr lang="en-US"/>
               <a:t>Click to edit Master text styles</a:t>
             </a:r>
           </a:p>
           <a:p>
             <a:pPr lvl="1"/>
             <a:r>
-              <a:rPr lang="en-US" smtClean="0"/>
+              <a:rPr lang="en-US"/>
               <a:t>Second level</a:t>
             </a:r>
           </a:p>
           <a:p>
             <a:pPr lvl="2"/>
             <a:r>
-              <a:rPr lang="en-US" smtClean="0"/>
+              <a:rPr lang="en-US"/>
               <a:t>Third level</a:t>
             </a:r>
           </a:p>
           <a:p>
             <a:pPr lvl="3"/>
             <a:r>
-              <a:rPr lang="en-US" smtClean="0"/>
+              <a:rPr lang="en-US"/>
               <a:t>Fourth level</a:t>
             </a:r>
           </a:p>
           <a:p>
             <a:pPr lvl="4"/>
             <a:r>
-              <a:rPr lang="en-US" smtClean="0"/>
+              <a:rPr lang="en-US"/>
               <a:t>Fifth level</a:t>
             </a:r>
-            <a:endParaRPr lang="en-US"/>
           </a:p>
         </p:txBody>
       </p:sp>
@@ -3073,7 +3067,7 @@
           <a:p>
             <a:fld id="{78C97017-6FC3-485B-9764-EAC9E56C1D49}" type="datetimeFigureOut">
               <a:rPr lang="en-US" smtClean="0"/>
-              <a:t>10/16/2016</a:t>
+              <a:t>10/29/2018</a:t>
             </a:fld>
             <a:endParaRPr lang="en-US"/>
           </a:p>
@@ -3456,8 +3450,8 @@
         </p:nvSpPr>
         <p:spPr>
           <a:xfrm>
-            <a:off x="1119865" y="2086382"/>
-            <a:ext cx="7871735" cy="1723618"/>
+            <a:off x="1229077" y="1994356"/>
+            <a:ext cx="7871735" cy="2481424"/>
           </a:xfrm>
           <a:prstGeom prst="roundRect">
             <a:avLst>
@@ -3494,7 +3488,7 @@
           <a:lstStyle/>
           <a:p>
             <a:r>
-              <a:rPr lang="en-US" sz="1200" b="1" dirty="0" smtClean="0">
+              <a:rPr lang="en-US" sz="1200" b="1" dirty="0">
                 <a:solidFill>
                   <a:schemeClr val="accent6">
                     <a:lumMod val="75000"/>
@@ -3561,7 +3555,7 @@
           <a:p>
             <a:pPr algn="ctr"/>
             <a:r>
-              <a:rPr lang="en-US" sz="1050" dirty="0" smtClean="0">
+              <a:rPr lang="en-US" sz="1050" dirty="0">
                 <a:solidFill>
                   <a:schemeClr val="bg1"/>
                 </a:solidFill>
@@ -3569,14 +3563,14 @@
               <a:t>&lt;&lt;interface&gt;&gt;</a:t>
             </a:r>
             <a:br>
-              <a:rPr lang="en-US" sz="1050" dirty="0" smtClean="0">
+              <a:rPr lang="en-US" sz="1050" dirty="0">
                 <a:solidFill>
                   <a:schemeClr val="bg1"/>
                 </a:solidFill>
               </a:rPr>
             </a:br>
             <a:r>
-              <a:rPr lang="en-US" sz="1050" dirty="0" err="1" smtClean="0">
+              <a:rPr lang="en-US" sz="1050" dirty="0">
                 <a:solidFill>
                   <a:schemeClr val="bg1"/>
                 </a:solidFill>
@@ -3639,7 +3633,7 @@
           <a:p>
             <a:pPr algn="ctr"/>
             <a:r>
-              <a:rPr lang="en-US" sz="1050" dirty="0" err="1" smtClean="0">
+              <a:rPr lang="en-US" sz="1050" dirty="0">
                 <a:solidFill>
                   <a:schemeClr val="bg1"/>
                 </a:solidFill>
@@ -3713,7 +3707,7 @@
           <a:p>
             <a:pPr algn="ctr"/>
             <a:r>
-              <a:rPr lang="en-US" sz="1050" dirty="0" smtClean="0">
+              <a:rPr lang="en-US" sz="1050" dirty="0">
                 <a:solidFill>
                   <a:schemeClr val="bg1"/>
                 </a:solidFill>
@@ -4147,7 +4141,7 @@
           <a:p>
             <a:pPr algn="ctr"/>
             <a:r>
-              <a:rPr lang="en-US" sz="1050" b="1" dirty="0" err="1" smtClean="0">
+              <a:rPr lang="en-US" sz="1050" b="1" dirty="0">
                 <a:solidFill>
                   <a:schemeClr val="accent6">
                     <a:lumMod val="75000"/>
@@ -4156,18 +4150,8 @@
               </a:rPr>
               <a:t>XmlAddressBook</a:t>
             </a:r>
-            <a:r>
-              <a:rPr lang="en-US" sz="1050" b="1" dirty="0" smtClean="0">
-                <a:solidFill>
-                  <a:schemeClr val="accent6">
-                    <a:lumMod val="75000"/>
-                  </a:schemeClr>
-                </a:solidFill>
-              </a:rPr>
-              <a:t/>
-            </a:r>
             <a:br>
-              <a:rPr lang="en-US" sz="1050" b="1" dirty="0" smtClean="0">
+              <a:rPr lang="en-US" sz="1050" b="1" dirty="0">
                 <a:solidFill>
                   <a:schemeClr val="accent6">
                     <a:lumMod val="75000"/>
@@ -4176,7 +4160,7 @@
               </a:rPr>
             </a:br>
             <a:r>
-              <a:rPr lang="en-US" sz="1050" b="1" dirty="0" smtClean="0">
+              <a:rPr lang="en-US" sz="1050" b="1" dirty="0">
                 <a:solidFill>
                   <a:schemeClr val="accent6">
                     <a:lumMod val="75000"/>
@@ -4243,7 +4227,7 @@
           <a:p>
             <a:pPr algn="ctr"/>
             <a:r>
-              <a:rPr lang="en-US" sz="1050" dirty="0" smtClean="0">
+              <a:rPr lang="en-US" sz="1050" dirty="0">
                 <a:solidFill>
                   <a:schemeClr val="bg1"/>
                 </a:solidFill>
@@ -4251,14 +4235,14 @@
               <a:t>&lt;&lt;interface&gt;&gt;</a:t>
             </a:r>
             <a:br>
-              <a:rPr lang="en-US" sz="1050" dirty="0" smtClean="0">
+              <a:rPr lang="en-US" sz="1050" dirty="0">
                 <a:solidFill>
                   <a:schemeClr val="bg1"/>
                 </a:solidFill>
               </a:rPr>
             </a:br>
             <a:r>
-              <a:rPr lang="en-US" sz="1050" dirty="0" err="1" smtClean="0">
+              <a:rPr lang="en-US" sz="1050" dirty="0">
                 <a:solidFill>
                   <a:schemeClr val="bg1"/>
                 </a:solidFill>
@@ -4516,30 +4500,22 @@
           <a:p>
             <a:pPr algn="ctr"/>
             <a:r>
-              <a:rPr lang="en-US" sz="1050" dirty="0" err="1" smtClean="0">
+              <a:rPr lang="en-US" sz="1050" dirty="0">
                 <a:solidFill>
                   <a:schemeClr val="bg1"/>
                 </a:solidFill>
               </a:rPr>
               <a:t>JsonUserPrefs</a:t>
             </a:r>
-            <a:r>
-              <a:rPr lang="en-US" sz="1050" dirty="0" smtClean="0">
-                <a:solidFill>
-                  <a:schemeClr val="bg1"/>
-                </a:solidFill>
-              </a:rPr>
-              <a:t/>
-            </a:r>
             <a:br>
-              <a:rPr lang="en-US" sz="1050" dirty="0" smtClean="0">
+              <a:rPr lang="en-US" sz="1050" dirty="0">
                 <a:solidFill>
                   <a:schemeClr val="bg1"/>
                 </a:solidFill>
               </a:rPr>
             </a:br>
             <a:r>
-              <a:rPr lang="en-US" sz="1050" dirty="0" smtClean="0">
+              <a:rPr lang="en-US" sz="1050" dirty="0">
                 <a:solidFill>
                   <a:schemeClr val="bg1"/>
                 </a:solidFill>
@@ -4591,7 +4567,7 @@
           <a:p>
             <a:pPr algn="ctr"/>
             <a:r>
-              <a:rPr lang="en-US" sz="1050" b="1" dirty="0" err="1" smtClean="0">
+              <a:rPr lang="en-US" sz="1050" b="1" dirty="0">
                 <a:solidFill>
                   <a:schemeClr val="accent6">
                     <a:lumMod val="75000"/>
@@ -4600,18 +4576,8 @@
               </a:rPr>
               <a:t>XmlSerializable</a:t>
             </a:r>
-            <a:r>
-              <a:rPr lang="en-US" sz="1050" b="1" dirty="0" smtClean="0">
-                <a:solidFill>
-                  <a:schemeClr val="accent6">
-                    <a:lumMod val="75000"/>
-                  </a:schemeClr>
-                </a:solidFill>
-              </a:rPr>
-              <a:t/>
-            </a:r>
             <a:br>
-              <a:rPr lang="en-US" sz="1050" b="1" dirty="0" smtClean="0">
+              <a:rPr lang="en-US" sz="1050" b="1" dirty="0">
                 <a:solidFill>
                   <a:schemeClr val="accent6">
                     <a:lumMod val="75000"/>
@@ -4620,7 +4586,7 @@
               </a:rPr>
             </a:br>
             <a:r>
-              <a:rPr lang="en-US" sz="1050" b="1" dirty="0" err="1" smtClean="0">
+              <a:rPr lang="en-US" sz="1050" b="1" dirty="0">
                 <a:solidFill>
                   <a:schemeClr val="accent6">
                     <a:lumMod val="75000"/>
@@ -4649,14 +4615,12 @@
           <p:nvPr/>
         </p:nvCxnSpPr>
         <p:spPr>
-          <a:xfrm rot="5400000" flipH="1" flipV="1">
-            <a:off x="8077993" y="2992020"/>
-            <a:ext cx="335208" cy="12700"/>
-          </a:xfrm>
-          <a:prstGeom prst="bentConnector3">
-            <a:avLst>
-              <a:gd name="adj1" fmla="val 50000"/>
-            </a:avLst>
+          <a:xfrm flipV="1">
+            <a:off x="8245597" y="2824416"/>
+            <a:ext cx="0" cy="335208"/>
+          </a:xfrm>
+          <a:prstGeom prst="straightConnector1">
+            <a:avLst/>
           </a:prstGeom>
           <a:ln w="19050">
             <a:prstDash val="sysDot"/>
@@ -4717,7 +4681,7 @@
           <a:p>
             <a:pPr algn="ctr"/>
             <a:r>
-              <a:rPr lang="en-US" sz="1050" b="1" dirty="0" err="1" smtClean="0">
+              <a:rPr lang="en-US" sz="1050" b="1" dirty="0">
                 <a:solidFill>
                   <a:schemeClr val="accent6">
                     <a:lumMod val="75000"/>
@@ -4773,7 +4737,7 @@
           <a:p>
             <a:pPr algn="ctr"/>
             <a:r>
-              <a:rPr lang="en-US" sz="1050" b="1" dirty="0" err="1" smtClean="0">
+              <a:rPr lang="en-US" sz="1050" b="1" dirty="0">
                 <a:solidFill>
                   <a:schemeClr val="accent6">
                     <a:lumMod val="75000"/>
@@ -4827,6 +4791,223 @@
           </a:fillRef>
           <a:effectRef idx="1">
             <a:schemeClr val="accent6"/>
+          </a:effectRef>
+          <a:fontRef idx="minor">
+            <a:schemeClr val="dk1"/>
+          </a:fontRef>
+        </p:style>
+      </p:cxnSp>
+      <p:sp>
+        <p:nvSpPr>
+          <p:cNvPr id="29" name="Rectangle 8">
+            <a:extLst>
+              <a:ext uri="{FF2B5EF4-FFF2-40B4-BE49-F238E27FC236}">
+                <a16:creationId xmlns:a16="http://schemas.microsoft.com/office/drawing/2014/main" id="{451DB7E2-1634-433E-A8FD-ED25366625DC}"/>
+              </a:ext>
+            </a:extLst>
+          </p:cNvPr>
+          <p:cNvSpPr/>
+          <p:nvPr/>
+        </p:nvSpPr>
+        <p:spPr>
+          <a:xfrm>
+            <a:off x="6019800" y="3860650"/>
+            <a:ext cx="1259718" cy="346760"/>
+          </a:xfrm>
+          <a:prstGeom prst="rect">
+            <a:avLst/>
+          </a:prstGeom>
+          <a:ln w="19050"/>
+          <a:effectLst/>
+        </p:spPr>
+        <p:style>
+          <a:lnRef idx="1">
+            <a:schemeClr val="accent6"/>
+          </a:lnRef>
+          <a:fillRef idx="2">
+            <a:schemeClr val="accent6"/>
+          </a:fillRef>
+          <a:effectRef idx="1">
+            <a:schemeClr val="accent6"/>
+          </a:effectRef>
+          <a:fontRef idx="minor">
+            <a:schemeClr val="dk1"/>
+          </a:fontRef>
+        </p:style>
+        <p:txBody>
+          <a:bodyPr rtlCol="0" anchor="ctr"/>
+          <a:lstStyle/>
+          <a:p>
+            <a:pPr algn="ctr"/>
+            <a:r>
+              <a:rPr lang="en-US" sz="1050" b="1" dirty="0">
+                <a:solidFill>
+                  <a:schemeClr val="accent6">
+                    <a:lumMod val="75000"/>
+                  </a:schemeClr>
+                </a:solidFill>
+              </a:rPr>
+              <a:t>XmlAdaptedGroup</a:t>
+            </a:r>
+            <a:endParaRPr lang="en-SG" sz="1050" b="1" dirty="0">
+              <a:solidFill>
+                <a:schemeClr val="accent6">
+                  <a:lumMod val="75000"/>
+                </a:schemeClr>
+              </a:solidFill>
+            </a:endParaRPr>
+          </a:p>
+        </p:txBody>
+      </p:sp>
+      <p:cxnSp>
+        <p:nvCxnSpPr>
+          <p:cNvPr id="31" name="Elbow Connector 122">
+            <a:extLst>
+              <a:ext uri="{FF2B5EF4-FFF2-40B4-BE49-F238E27FC236}">
+                <a16:creationId xmlns:a16="http://schemas.microsoft.com/office/drawing/2014/main" id="{8782BA9E-2B0F-4DFA-8C9F-F8A21114A89A}"/>
+              </a:ext>
+            </a:extLst>
+          </p:cNvPr>
+          <p:cNvCxnSpPr>
+            <a:cxnSpLocks/>
+          </p:cNvCxnSpPr>
+          <p:nvPr/>
+        </p:nvCxnSpPr>
+        <p:spPr>
+          <a:xfrm>
+            <a:off x="6620153" y="3505200"/>
+            <a:ext cx="0" cy="355450"/>
+          </a:xfrm>
+          <a:prstGeom prst="straightConnector1">
+            <a:avLst/>
+          </a:prstGeom>
+          <a:ln w="19050">
+            <a:prstDash val="sysDot"/>
+            <a:headEnd type="none" w="med" len="med"/>
+            <a:tailEnd type="arrow" w="med" len="med"/>
+          </a:ln>
+          <a:effectLst/>
+        </p:spPr>
+        <p:style>
+          <a:lnRef idx="1">
+            <a:schemeClr val="accent6"/>
+          </a:lnRef>
+          <a:fillRef idx="2">
+            <a:schemeClr val="accent6"/>
+          </a:fillRef>
+          <a:effectRef idx="1">
+            <a:schemeClr val="accent6"/>
+          </a:effectRef>
+          <a:fontRef idx="minor">
+            <a:schemeClr val="dk1"/>
+          </a:fontRef>
+        </p:style>
+      </p:cxnSp>
+      <p:sp>
+        <p:nvSpPr>
+          <p:cNvPr id="35" name="Rectangle 8">
+            <a:extLst>
+              <a:ext uri="{FF2B5EF4-FFF2-40B4-BE49-F238E27FC236}">
+                <a16:creationId xmlns:a16="http://schemas.microsoft.com/office/drawing/2014/main" id="{2A5E9676-467F-40AA-A187-3012ACE323E1}"/>
+              </a:ext>
+            </a:extLst>
+          </p:cNvPr>
+          <p:cNvSpPr/>
+          <p:nvPr/>
+        </p:nvSpPr>
+        <p:spPr>
+          <a:xfrm>
+            <a:off x="7599815" y="3860650"/>
+            <a:ext cx="1259718" cy="346760"/>
+          </a:xfrm>
+          <a:prstGeom prst="rect">
+            <a:avLst/>
+          </a:prstGeom>
+          <a:ln w="19050"/>
+          <a:effectLst/>
+        </p:spPr>
+        <p:style>
+          <a:lnRef idx="1">
+            <a:schemeClr val="accent6"/>
+          </a:lnRef>
+          <a:fillRef idx="2">
+            <a:schemeClr val="accent6"/>
+          </a:fillRef>
+          <a:effectRef idx="1">
+            <a:schemeClr val="accent6"/>
+          </a:effectRef>
+          <a:fontRef idx="minor">
+            <a:schemeClr val="dk1"/>
+          </a:fontRef>
+        </p:style>
+        <p:txBody>
+          <a:bodyPr rtlCol="0" anchor="ctr"/>
+          <a:lstStyle/>
+          <a:p>
+            <a:pPr algn="ctr"/>
+            <a:r>
+              <a:rPr lang="en-US" sz="1050" b="1" dirty="0">
+                <a:solidFill>
+                  <a:schemeClr val="accent6">
+                    <a:lumMod val="75000"/>
+                  </a:schemeClr>
+                </a:solidFill>
+              </a:rPr>
+              <a:t>XmlAdaptedTag</a:t>
+            </a:r>
+            <a:endParaRPr lang="en-SG" sz="1050" b="1" dirty="0">
+              <a:solidFill>
+                <a:schemeClr val="accent6">
+                  <a:lumMod val="75000"/>
+                </a:schemeClr>
+              </a:solidFill>
+            </a:endParaRPr>
+          </a:p>
+        </p:txBody>
+      </p:sp>
+      <p:cxnSp>
+        <p:nvCxnSpPr>
+          <p:cNvPr id="36" name="Elbow Connector 122">
+            <a:extLst>
+              <a:ext uri="{FF2B5EF4-FFF2-40B4-BE49-F238E27FC236}">
+                <a16:creationId xmlns:a16="http://schemas.microsoft.com/office/drawing/2014/main" id="{FB9D6697-A64C-49B6-8D4C-89B163DEA3A7}"/>
+              </a:ext>
+            </a:extLst>
+          </p:cNvPr>
+          <p:cNvCxnSpPr/>
+          <p:nvPr/>
+        </p:nvCxnSpPr>
+        <p:spPr>
+          <a:xfrm>
+            <a:off x="7371215" y="4050306"/>
+            <a:ext cx="228600" cy="1970"/>
+          </a:xfrm>
+          <a:prstGeom prst="bentConnector3">
+            <a:avLst>
+              <a:gd name="adj1" fmla="val -35437"/>
+            </a:avLst>
+          </a:prstGeom>
+          <a:ln w="19050">
+            <a:solidFill>
+              <a:schemeClr val="accent6">
+                <a:lumMod val="75000"/>
+              </a:schemeClr>
+            </a:solidFill>
+            <a:prstDash val="sysDot"/>
+            <a:headEnd type="none" w="med" len="med"/>
+            <a:tailEnd type="arrow" w="med" len="med"/>
+          </a:ln>
+          <a:effectLst/>
+        </p:spPr>
+        <p:style>
+          <a:lnRef idx="1">
+            <a:schemeClr val="accent2"/>
+          </a:lnRef>
+          <a:fillRef idx="2">
+            <a:schemeClr val="accent2"/>
+          </a:fillRef>
+          <a:effectRef idx="1">
+            <a:schemeClr val="accent2"/>
           </a:effectRef>
           <a:fontRef idx="minor">
             <a:schemeClr val="dk1"/>
@@ -4843,13 +5024,6 @@
   <p:clrMapOvr>
     <a:masterClrMapping/>
   </p:clrMapOvr>
-  <p:timing>
-    <p:tnLst>
-      <p:par>
-        <p:cTn id="1" dur="indefinite" restart="never" nodeType="tmRoot"/>
-      </p:par>
-    </p:tnLst>
-  </p:timing>
 </p:sld>
 </file>
 

</xml_diff>

<commit_message>
Update Dev Guide Storage Class Diagram
</commit_message>
<xml_diff>
--- a/docs/diagrams/StorageComponentClassDiagram.pptx
+++ b/docs/diagrams/StorageComponentClassDiagram.pptx
@@ -3451,7 +3451,7 @@
         <p:spPr>
           <a:xfrm>
             <a:off x="1229077" y="1994356"/>
-            <a:ext cx="7871735" cy="2481424"/>
+            <a:ext cx="7871735" cy="3026264"/>
           </a:xfrm>
           <a:prstGeom prst="roundRect">
             <a:avLst>
@@ -3516,7 +3516,7 @@
         <p:spPr>
           <a:xfrm>
             <a:off x="2877180" y="3158440"/>
-            <a:ext cx="1323049" cy="346760"/>
+            <a:ext cx="1323049" cy="323049"/>
           </a:xfrm>
           <a:prstGeom prst="rect">
             <a:avLst/>
@@ -3593,8 +3593,8 @@
         </p:nvSpPr>
         <p:spPr>
           <a:xfrm rot="16200000">
-            <a:off x="1683963" y="2868687"/>
-            <a:ext cx="1093635" cy="346760"/>
+            <a:off x="1721354" y="2831296"/>
+            <a:ext cx="1018853" cy="346760"/>
           </a:xfrm>
           <a:prstGeom prst="rect">
             <a:avLst/>
@@ -3656,8 +3656,8 @@
         </p:nvSpPr>
         <p:spPr>
           <a:xfrm rot="16200000">
-            <a:off x="956202" y="2861202"/>
-            <a:ext cx="1093635" cy="346760"/>
+            <a:off x="993593" y="2823811"/>
+            <a:ext cx="1018853" cy="346760"/>
           </a:xfrm>
           <a:prstGeom prst="rect">
             <a:avLst/>
@@ -3730,8 +3730,8 @@
         </p:nvSpPr>
         <p:spPr>
           <a:xfrm rot="16200000">
-            <a:off x="1626910" y="2952291"/>
-            <a:ext cx="270504" cy="175523"/>
+            <a:off x="1636159" y="2943043"/>
+            <a:ext cx="252007" cy="175523"/>
           </a:xfrm>
           <a:prstGeom prst="triangle">
             <a:avLst/>
@@ -3787,9 +3787,9 @@
           <p:nvPr/>
         </p:nvCxnSpPr>
         <p:spPr>
-          <a:xfrm>
-            <a:off x="2656370" y="3326536"/>
-            <a:ext cx="220810" cy="5284"/>
+          <a:xfrm flipV="1">
+            <a:off x="2656370" y="3319965"/>
+            <a:ext cx="220810" cy="643"/>
           </a:xfrm>
           <a:prstGeom prst="straightConnector1">
             <a:avLst/>
@@ -3823,7 +3823,9 @@
       <p:cxnSp>
         <p:nvCxnSpPr>
           <p:cNvPr id="75" name="Elbow Connector 122"/>
-          <p:cNvCxnSpPr/>
+          <p:cNvCxnSpPr>
+            <a:cxnSpLocks/>
+          </p:cNvCxnSpPr>
           <p:nvPr/>
         </p:nvCxnSpPr>
         <p:spPr>
@@ -3872,9 +3874,9 @@
           <p:nvPr/>
         </p:nvCxnSpPr>
         <p:spPr>
-          <a:xfrm flipV="1">
-            <a:off x="1849924" y="3040052"/>
-            <a:ext cx="216105" cy="1"/>
+          <a:xfrm>
+            <a:off x="1849924" y="3030804"/>
+            <a:ext cx="216105" cy="9249"/>
           </a:xfrm>
           <a:prstGeom prst="line">
             <a:avLst/>
@@ -3915,7 +3917,7 @@
         <p:spPr>
           <a:xfrm>
             <a:off x="2420322" y="3239846"/>
-            <a:ext cx="236048" cy="173380"/>
+            <a:ext cx="236048" cy="161524"/>
           </a:xfrm>
           <a:prstGeom prst="flowChartDecision">
             <a:avLst/>
@@ -3968,8 +3970,8 @@
         </p:nvCxnSpPr>
         <p:spPr>
           <a:xfrm flipV="1">
-            <a:off x="4398041" y="3331820"/>
-            <a:ext cx="223324" cy="1"/>
+            <a:off x="4398041" y="3319965"/>
+            <a:ext cx="223324" cy="2609"/>
           </a:xfrm>
           <a:prstGeom prst="bentConnector3">
             <a:avLst>
@@ -4011,8 +4013,8 @@
         </p:nvSpPr>
         <p:spPr>
           <a:xfrm rot="5400000" flipV="1">
-            <a:off x="4175027" y="3244059"/>
-            <a:ext cx="270504" cy="175523"/>
+            <a:off x="4184275" y="3234812"/>
+            <a:ext cx="252009" cy="175523"/>
           </a:xfrm>
           <a:prstGeom prst="triangle">
             <a:avLst/>
@@ -4069,7 +4071,7 @@
         </p:nvCxnSpPr>
         <p:spPr>
           <a:xfrm>
-            <a:off x="5791200" y="3331820"/>
+            <a:off x="5791200" y="3319965"/>
             <a:ext cx="228600" cy="1970"/>
           </a:xfrm>
           <a:prstGeom prst="bentConnector3">
@@ -4113,7 +4115,7 @@
         <p:spPr>
           <a:xfrm>
             <a:off x="4621365" y="3158440"/>
-            <a:ext cx="1169835" cy="346760"/>
+            <a:ext cx="1169835" cy="323049"/>
           </a:xfrm>
           <a:prstGeom prst="rect">
             <a:avLst/>
@@ -4188,7 +4190,7 @@
         <p:spPr>
           <a:xfrm>
             <a:off x="2873943" y="2558040"/>
-            <a:ext cx="1323049" cy="346760"/>
+            <a:ext cx="1323049" cy="323049"/>
           </a:xfrm>
           <a:prstGeom prst="rect">
             <a:avLst/>
@@ -4267,9 +4269,9 @@
           <p:nvPr/>
         </p:nvCxnSpPr>
         <p:spPr>
-          <a:xfrm>
-            <a:off x="2653133" y="2726136"/>
-            <a:ext cx="220810" cy="5284"/>
+          <a:xfrm flipV="1">
+            <a:off x="2653133" y="2719565"/>
+            <a:ext cx="220810" cy="643"/>
           </a:xfrm>
           <a:prstGeom prst="straightConnector1">
             <a:avLst/>
@@ -4309,7 +4311,7 @@
         <p:spPr>
           <a:xfrm>
             <a:off x="2417085" y="2639446"/>
-            <a:ext cx="236048" cy="173380"/>
+            <a:ext cx="236048" cy="161524"/>
           </a:xfrm>
           <a:prstGeom prst="flowChartDecision">
             <a:avLst/>
@@ -4362,8 +4364,8 @@
         </p:nvCxnSpPr>
         <p:spPr>
           <a:xfrm flipV="1">
-            <a:off x="4394804" y="2731420"/>
-            <a:ext cx="223324" cy="1"/>
+            <a:off x="4394804" y="2719565"/>
+            <a:ext cx="223324" cy="2609"/>
           </a:xfrm>
           <a:prstGeom prst="bentConnector3">
             <a:avLst>
@@ -4405,8 +4407,8 @@
         </p:nvSpPr>
         <p:spPr>
           <a:xfrm rot="5400000" flipV="1">
-            <a:off x="4171790" y="2643659"/>
-            <a:ext cx="270504" cy="175523"/>
+            <a:off x="4181038" y="2634412"/>
+            <a:ext cx="252009" cy="175523"/>
           </a:xfrm>
           <a:prstGeom prst="triangle">
             <a:avLst/>
@@ -4461,7 +4463,7 @@
         <p:spPr>
           <a:xfrm>
             <a:off x="4618128" y="2558040"/>
-            <a:ext cx="1093635" cy="346760"/>
+            <a:ext cx="1093635" cy="323049"/>
           </a:xfrm>
           <a:prstGeom prst="rect">
             <a:avLst/>
@@ -4539,7 +4541,7 @@
         <p:spPr>
           <a:xfrm>
             <a:off x="6019800" y="3160410"/>
-            <a:ext cx="1200707" cy="346760"/>
+            <a:ext cx="1200707" cy="323049"/>
           </a:xfrm>
           <a:prstGeom prst="rect">
             <a:avLst/>
@@ -4616,8 +4618,8 @@
         </p:nvCxnSpPr>
         <p:spPr>
           <a:xfrm flipV="1">
-            <a:off x="8245597" y="2824416"/>
-            <a:ext cx="0" cy="335208"/>
+            <a:off x="8245597" y="2800705"/>
+            <a:ext cx="0" cy="358919"/>
           </a:xfrm>
           <a:prstGeom prst="straightConnector1">
             <a:avLst/>
@@ -4653,7 +4655,7 @@
         <p:spPr>
           <a:xfrm>
             <a:off x="7615738" y="2477656"/>
-            <a:ext cx="1259718" cy="346760"/>
+            <a:ext cx="1259718" cy="323049"/>
           </a:xfrm>
           <a:prstGeom prst="rect">
             <a:avLst/>
@@ -4709,7 +4711,7 @@
         <p:spPr>
           <a:xfrm>
             <a:off x="7615738" y="3159624"/>
-            <a:ext cx="1259718" cy="346760"/>
+            <a:ext cx="1259718" cy="323049"/>
           </a:xfrm>
           <a:prstGeom prst="rect">
             <a:avLst/>
@@ -4767,7 +4769,7 @@
         </p:nvCxnSpPr>
         <p:spPr>
           <a:xfrm flipV="1">
-            <a:off x="7220507" y="3333004"/>
+            <a:off x="7220507" y="3321149"/>
             <a:ext cx="395231" cy="786"/>
           </a:xfrm>
           <a:prstGeom prst="bentConnector3">
@@ -4812,7 +4814,7 @@
         <p:spPr>
           <a:xfrm>
             <a:off x="6019800" y="3860650"/>
-            <a:ext cx="1259718" cy="346760"/>
+            <a:ext cx="1259718" cy="323049"/>
           </a:xfrm>
           <a:prstGeom prst="rect">
             <a:avLst/>
@@ -4876,7 +4878,7 @@
         <p:spPr>
           <a:xfrm>
             <a:off x="6620153" y="3505200"/>
-            <a:ext cx="0" cy="355450"/>
+            <a:ext cx="0" cy="331144"/>
           </a:xfrm>
           <a:prstGeom prst="straightConnector1">
             <a:avLst/>
@@ -4917,8 +4919,8 @@
         </p:nvSpPr>
         <p:spPr>
           <a:xfrm>
-            <a:off x="7599815" y="3860650"/>
-            <a:ext cx="1259718" cy="346760"/>
+            <a:off x="7608066" y="3871197"/>
+            <a:ext cx="1259718" cy="323049"/>
           </a:xfrm>
           <a:prstGeom prst="rect">
             <a:avLst/>
@@ -4974,18 +4976,20 @@
               </a:ext>
             </a:extLst>
           </p:cNvPr>
-          <p:cNvCxnSpPr/>
+          <p:cNvCxnSpPr>
+            <a:cxnSpLocks/>
+            <a:stCxn id="29" idx="3"/>
+            <a:endCxn id="35" idx="1"/>
+          </p:cNvCxnSpPr>
           <p:nvPr/>
         </p:nvCxnSpPr>
         <p:spPr>
           <a:xfrm>
-            <a:off x="7371215" y="4050306"/>
-            <a:ext cx="228600" cy="1970"/>
-          </a:xfrm>
-          <a:prstGeom prst="bentConnector3">
-            <a:avLst>
-              <a:gd name="adj1" fmla="val -35437"/>
-            </a:avLst>
+            <a:off x="7279518" y="4022175"/>
+            <a:ext cx="328548" cy="10547"/>
+          </a:xfrm>
+          <a:prstGeom prst="straightConnector1">
+            <a:avLst/>
           </a:prstGeom>
           <a:ln w="19050">
             <a:solidFill>
@@ -5008,6 +5012,113 @@
           </a:fillRef>
           <a:effectRef idx="1">
             <a:schemeClr val="accent2"/>
+          </a:effectRef>
+          <a:fontRef idx="minor">
+            <a:schemeClr val="dk1"/>
+          </a:fontRef>
+        </p:style>
+      </p:cxnSp>
+      <p:sp>
+        <p:nvSpPr>
+          <p:cNvPr id="30" name="Rectangle 8">
+            <a:extLst>
+              <a:ext uri="{FF2B5EF4-FFF2-40B4-BE49-F238E27FC236}">
+                <a16:creationId xmlns:a16="http://schemas.microsoft.com/office/drawing/2014/main" id="{2BCA4DD6-5807-4543-846A-34315865C2AC}"/>
+              </a:ext>
+            </a:extLst>
+          </p:cNvPr>
+          <p:cNvSpPr/>
+          <p:nvPr/>
+        </p:nvSpPr>
+        <p:spPr>
+          <a:xfrm>
+            <a:off x="7599815" y="4422032"/>
+            <a:ext cx="1259718" cy="323049"/>
+          </a:xfrm>
+          <a:prstGeom prst="rect">
+            <a:avLst/>
+          </a:prstGeom>
+          <a:ln w="19050"/>
+          <a:effectLst/>
+        </p:spPr>
+        <p:style>
+          <a:lnRef idx="1">
+            <a:schemeClr val="accent6"/>
+          </a:lnRef>
+          <a:fillRef idx="2">
+            <a:schemeClr val="accent6"/>
+          </a:fillRef>
+          <a:effectRef idx="1">
+            <a:schemeClr val="accent6"/>
+          </a:effectRef>
+          <a:fontRef idx="minor">
+            <a:schemeClr val="dk1"/>
+          </a:fontRef>
+        </p:style>
+        <p:txBody>
+          <a:bodyPr rtlCol="0" anchor="ctr"/>
+          <a:lstStyle/>
+          <a:p>
+            <a:pPr algn="ctr"/>
+            <a:r>
+              <a:rPr lang="en-US" sz="1050" b="1" dirty="0">
+                <a:solidFill>
+                  <a:schemeClr val="accent6">
+                    <a:lumMod val="75000"/>
+                  </a:schemeClr>
+                </a:solidFill>
+              </a:rPr>
+              <a:t>XmlAdaptedPerson</a:t>
+            </a:r>
+            <a:endParaRPr lang="en-SG" sz="1050" b="1" dirty="0">
+              <a:solidFill>
+                <a:schemeClr val="accent6">
+                  <a:lumMod val="75000"/>
+                </a:schemeClr>
+              </a:solidFill>
+            </a:endParaRPr>
+          </a:p>
+        </p:txBody>
+      </p:sp>
+      <p:cxnSp>
+        <p:nvCxnSpPr>
+          <p:cNvPr id="32" name="Elbow Connector 122">
+            <a:extLst>
+              <a:ext uri="{FF2B5EF4-FFF2-40B4-BE49-F238E27FC236}">
+                <a16:creationId xmlns:a16="http://schemas.microsoft.com/office/drawing/2014/main" id="{A7B30FBE-A8A4-4B15-9C5B-6AEB6A39AD31}"/>
+              </a:ext>
+            </a:extLst>
+          </p:cNvPr>
+          <p:cNvCxnSpPr>
+            <a:cxnSpLocks/>
+            <a:stCxn id="29" idx="2"/>
+          </p:cNvCxnSpPr>
+          <p:nvPr/>
+        </p:nvCxnSpPr>
+        <p:spPr>
+          <a:xfrm rot="16200000" flipH="1">
+            <a:off x="6918880" y="3914478"/>
+            <a:ext cx="411714" cy="950156"/>
+          </a:xfrm>
+          <a:prstGeom prst="bentConnector2">
+            <a:avLst/>
+          </a:prstGeom>
+          <a:ln w="19050">
+            <a:prstDash val="sysDot"/>
+            <a:headEnd type="none" w="med" len="med"/>
+            <a:tailEnd type="arrow" w="med" len="med"/>
+          </a:ln>
+          <a:effectLst/>
+        </p:spPr>
+        <p:style>
+          <a:lnRef idx="1">
+            <a:schemeClr val="accent6"/>
+          </a:lnRef>
+          <a:fillRef idx="2">
+            <a:schemeClr val="accent6"/>
+          </a:fillRef>
+          <a:effectRef idx="1">
+            <a:schemeClr val="accent6"/>
           </a:effectRef>
           <a:fontRef idx="minor">
             <a:schemeClr val="dk1"/>

</xml_diff>

<commit_message>
Update Developer Guide - Storage component
</commit_message>
<xml_diff>
--- a/docs/diagrams/StorageComponentClassDiagram.pptx
+++ b/docs/diagrams/StorageComponentClassDiagram.pptx
@@ -208,7 +208,7 @@
           <a:p>
             <a:fld id="{F5CC4B3F-88C1-4FFA-B1B6-F41C21DC6924}" type="datetimeFigureOut">
               <a:rPr lang="en-US" smtClean="0"/>
-              <a:t>10/15/2018</a:t>
+              <a:t>10/30/2018</a:t>
             </a:fld>
             <a:endParaRPr lang="en-US"/>
           </a:p>
@@ -654,7 +654,7 @@
           <a:p>
             <a:fld id="{78C97017-6FC3-485B-9764-EAC9E56C1D49}" type="datetimeFigureOut">
               <a:rPr lang="en-US" smtClean="0"/>
-              <a:t>10/15/2018</a:t>
+              <a:t>10/30/2018</a:t>
             </a:fld>
             <a:endParaRPr lang="en-US"/>
           </a:p>
@@ -822,7 +822,7 @@
           <a:p>
             <a:fld id="{78C97017-6FC3-485B-9764-EAC9E56C1D49}" type="datetimeFigureOut">
               <a:rPr lang="en-US" smtClean="0"/>
-              <a:t>10/15/2018</a:t>
+              <a:t>10/30/2018</a:t>
             </a:fld>
             <a:endParaRPr lang="en-US"/>
           </a:p>
@@ -1000,7 +1000,7 @@
           <a:p>
             <a:fld id="{78C97017-6FC3-485B-9764-EAC9E56C1D49}" type="datetimeFigureOut">
               <a:rPr lang="en-US" smtClean="0"/>
-              <a:t>10/15/2018</a:t>
+              <a:t>10/30/2018</a:t>
             </a:fld>
             <a:endParaRPr lang="en-US"/>
           </a:p>
@@ -1168,7 +1168,7 @@
           <a:p>
             <a:fld id="{78C97017-6FC3-485B-9764-EAC9E56C1D49}" type="datetimeFigureOut">
               <a:rPr lang="en-US" smtClean="0"/>
-              <a:t>10/15/2018</a:t>
+              <a:t>10/30/2018</a:t>
             </a:fld>
             <a:endParaRPr lang="en-US"/>
           </a:p>
@@ -1413,7 +1413,7 @@
           <a:p>
             <a:fld id="{78C97017-6FC3-485B-9764-EAC9E56C1D49}" type="datetimeFigureOut">
               <a:rPr lang="en-US" smtClean="0"/>
-              <a:t>10/15/2018</a:t>
+              <a:t>10/30/2018</a:t>
             </a:fld>
             <a:endParaRPr lang="en-US"/>
           </a:p>
@@ -1698,7 +1698,7 @@
           <a:p>
             <a:fld id="{78C97017-6FC3-485B-9764-EAC9E56C1D49}" type="datetimeFigureOut">
               <a:rPr lang="en-US" smtClean="0"/>
-              <a:t>10/15/2018</a:t>
+              <a:t>10/30/2018</a:t>
             </a:fld>
             <a:endParaRPr lang="en-US"/>
           </a:p>
@@ -2117,7 +2117,7 @@
           <a:p>
             <a:fld id="{78C97017-6FC3-485B-9764-EAC9E56C1D49}" type="datetimeFigureOut">
               <a:rPr lang="en-US" smtClean="0"/>
-              <a:t>10/15/2018</a:t>
+              <a:t>10/30/2018</a:t>
             </a:fld>
             <a:endParaRPr lang="en-US"/>
           </a:p>
@@ -2234,7 +2234,7 @@
           <a:p>
             <a:fld id="{78C97017-6FC3-485B-9764-EAC9E56C1D49}" type="datetimeFigureOut">
               <a:rPr lang="en-US" smtClean="0"/>
-              <a:t>10/15/2018</a:t>
+              <a:t>10/30/2018</a:t>
             </a:fld>
             <a:endParaRPr lang="en-US"/>
           </a:p>
@@ -2329,7 +2329,7 @@
           <a:p>
             <a:fld id="{78C97017-6FC3-485B-9764-EAC9E56C1D49}" type="datetimeFigureOut">
               <a:rPr lang="en-US" smtClean="0"/>
-              <a:t>10/15/2018</a:t>
+              <a:t>10/30/2018</a:t>
             </a:fld>
             <a:endParaRPr lang="en-US"/>
           </a:p>
@@ -2604,7 +2604,7 @@
           <a:p>
             <a:fld id="{78C97017-6FC3-485B-9764-EAC9E56C1D49}" type="datetimeFigureOut">
               <a:rPr lang="en-US" smtClean="0"/>
-              <a:t>10/15/2018</a:t>
+              <a:t>10/30/2018</a:t>
             </a:fld>
             <a:endParaRPr lang="en-US"/>
           </a:p>
@@ -2856,7 +2856,7 @@
           <a:p>
             <a:fld id="{78C97017-6FC3-485B-9764-EAC9E56C1D49}" type="datetimeFigureOut">
               <a:rPr lang="en-US" smtClean="0"/>
-              <a:t>10/15/2018</a:t>
+              <a:t>10/30/2018</a:t>
             </a:fld>
             <a:endParaRPr lang="en-US"/>
           </a:p>
@@ -3067,7 +3067,7 @@
           <a:p>
             <a:fld id="{78C97017-6FC3-485B-9764-EAC9E56C1D49}" type="datetimeFigureOut">
               <a:rPr lang="en-US" smtClean="0"/>
-              <a:t>10/15/2018</a:t>
+              <a:t>10/30/2018</a:t>
             </a:fld>
             <a:endParaRPr lang="en-US"/>
           </a:p>
@@ -3515,7 +3515,7 @@
         </p:nvSpPr>
         <p:spPr>
           <a:xfrm>
-            <a:off x="2877180" y="3158440"/>
+            <a:off x="2875169" y="2886400"/>
             <a:ext cx="1323049" cy="346760"/>
           </a:xfrm>
           <a:prstGeom prst="rect">
@@ -3788,7 +3788,7 @@
         </p:nvCxnSpPr>
         <p:spPr>
           <a:xfrm>
-            <a:off x="2656370" y="3326536"/>
+            <a:off x="2654359" y="3054496"/>
             <a:ext cx="220810" cy="5284"/>
           </a:xfrm>
           <a:prstGeom prst="straightConnector1">
@@ -3914,7 +3914,7 @@
         </p:nvSpPr>
         <p:spPr>
           <a:xfrm>
-            <a:off x="2420322" y="3239846"/>
+            <a:off x="2418311" y="2967806"/>
             <a:ext cx="236048" cy="173380"/>
           </a:xfrm>
           <a:prstGeom prst="flowChartDecision">
@@ -3968,7 +3968,7 @@
         </p:nvCxnSpPr>
         <p:spPr>
           <a:xfrm flipV="1">
-            <a:off x="4398041" y="3331820"/>
+            <a:off x="4396030" y="3059780"/>
             <a:ext cx="223324" cy="1"/>
           </a:xfrm>
           <a:prstGeom prst="bentConnector3">
@@ -4011,7 +4011,7 @@
         </p:nvSpPr>
         <p:spPr>
           <a:xfrm rot="5400000" flipV="1">
-            <a:off x="4175027" y="3244059"/>
+            <a:off x="4173016" y="2972019"/>
             <a:ext cx="270504" cy="175523"/>
           </a:xfrm>
           <a:prstGeom prst="triangle">
@@ -4069,7 +4069,7 @@
         </p:nvCxnSpPr>
         <p:spPr>
           <a:xfrm>
-            <a:off x="5791200" y="3331820"/>
+            <a:off x="5789189" y="3059780"/>
             <a:ext cx="228600" cy="1970"/>
           </a:xfrm>
           <a:prstGeom prst="bentConnector3">
@@ -4112,7 +4112,7 @@
         </p:nvSpPr>
         <p:spPr>
           <a:xfrm>
-            <a:off x="4621365" y="3158440"/>
+            <a:off x="4619354" y="2886400"/>
             <a:ext cx="1169835" cy="346760"/>
           </a:xfrm>
           <a:prstGeom prst="rect">
@@ -4187,7 +4187,7 @@
         </p:nvSpPr>
         <p:spPr>
           <a:xfrm>
-            <a:off x="2873943" y="2558040"/>
+            <a:off x="2871932" y="2286000"/>
             <a:ext cx="1323049" cy="346760"/>
           </a:xfrm>
           <a:prstGeom prst="rect">
@@ -4268,7 +4268,7 @@
         </p:nvCxnSpPr>
         <p:spPr>
           <a:xfrm>
-            <a:off x="2653133" y="2726136"/>
+            <a:off x="2651122" y="2454096"/>
             <a:ext cx="220810" cy="5284"/>
           </a:xfrm>
           <a:prstGeom prst="straightConnector1">
@@ -4308,7 +4308,7 @@
         </p:nvSpPr>
         <p:spPr>
           <a:xfrm>
-            <a:off x="2417085" y="2639446"/>
+            <a:off x="2415074" y="2367406"/>
             <a:ext cx="236048" cy="173380"/>
           </a:xfrm>
           <a:prstGeom prst="flowChartDecision">
@@ -4362,7 +4362,7 @@
         </p:nvCxnSpPr>
         <p:spPr>
           <a:xfrm flipV="1">
-            <a:off x="4394804" y="2731420"/>
+            <a:off x="4392793" y="2459380"/>
             <a:ext cx="223324" cy="1"/>
           </a:xfrm>
           <a:prstGeom prst="bentConnector3">
@@ -4405,7 +4405,7 @@
         </p:nvSpPr>
         <p:spPr>
           <a:xfrm rot="5400000" flipV="1">
-            <a:off x="4171790" y="2643659"/>
+            <a:off x="4169779" y="2371619"/>
             <a:ext cx="270504" cy="175523"/>
           </a:xfrm>
           <a:prstGeom prst="triangle">
@@ -4460,7 +4460,7 @@
         </p:nvSpPr>
         <p:spPr>
           <a:xfrm>
-            <a:off x="4618128" y="2558040"/>
+            <a:off x="4616117" y="2286000"/>
             <a:ext cx="1093635" cy="346760"/>
           </a:xfrm>
           <a:prstGeom prst="rect">
@@ -4538,7 +4538,7 @@
         </p:nvSpPr>
         <p:spPr>
           <a:xfrm>
-            <a:off x="6019800" y="3160410"/>
+            <a:off x="6017789" y="2888370"/>
             <a:ext cx="1200707" cy="346760"/>
           </a:xfrm>
           <a:prstGeom prst="rect">
@@ -4616,7 +4616,7 @@
         </p:nvCxnSpPr>
         <p:spPr>
           <a:xfrm rot="5400000" flipH="1" flipV="1">
-            <a:off x="8077993" y="2992020"/>
+            <a:off x="8075982" y="2719980"/>
             <a:ext cx="335208" cy="12700"/>
           </a:xfrm>
           <a:prstGeom prst="bentConnector3">
@@ -4654,7 +4654,7 @@
         </p:nvSpPr>
         <p:spPr>
           <a:xfrm>
-            <a:off x="7615738" y="2477656"/>
+            <a:off x="7613727" y="2205616"/>
             <a:ext cx="1259718" cy="346760"/>
           </a:xfrm>
           <a:prstGeom prst="rect">
@@ -4710,7 +4710,7 @@
         </p:nvSpPr>
         <p:spPr>
           <a:xfrm>
-            <a:off x="7615738" y="3159624"/>
+            <a:off x="7613727" y="2887584"/>
             <a:ext cx="1259718" cy="346760"/>
           </a:xfrm>
           <a:prstGeom prst="rect">
@@ -4769,7 +4769,7 @@
         </p:nvCxnSpPr>
         <p:spPr>
           <a:xfrm flipV="1">
-            <a:off x="7220507" y="3333004"/>
+            <a:off x="7218496" y="3060964"/>
             <a:ext cx="395231" cy="786"/>
           </a:xfrm>
           <a:prstGeom prst="bentConnector3">
@@ -4799,393 +4799,6 @@
           </a:fontRef>
         </p:style>
       </p:cxnSp>
-      <p:cxnSp>
-        <p:nvCxnSpPr>
-          <p:cNvPr id="26" name="Straight Arrow Connector 25">
-            <a:extLst>
-              <a:ext uri="{FF2B5EF4-FFF2-40B4-BE49-F238E27FC236}">
-                <a16:creationId xmlns:a16="http://schemas.microsoft.com/office/drawing/2014/main" id="{F8615C77-FB20-497A-A798-0AE0764672B1}"/>
-              </a:ext>
-            </a:extLst>
-          </p:cNvPr>
-          <p:cNvCxnSpPr>
-            <a:stCxn id="27" idx="3"/>
-          </p:cNvCxnSpPr>
-          <p:nvPr/>
-        </p:nvCxnSpPr>
-        <p:spPr>
-          <a:xfrm>
-            <a:off x="2653133" y="2141229"/>
-            <a:ext cx="220810" cy="5284"/>
-          </a:xfrm>
-          <a:prstGeom prst="straightConnector1">
-            <a:avLst/>
-          </a:prstGeom>
-          <a:ln w="19050">
-            <a:solidFill>
-              <a:schemeClr val="accent6">
-                <a:lumMod val="75000"/>
-              </a:schemeClr>
-            </a:solidFill>
-            <a:headEnd type="none" w="med" len="med"/>
-            <a:tailEnd type="arrow" w="med" len="med"/>
-          </a:ln>
-          <a:effectLst/>
-        </p:spPr>
-        <p:style>
-          <a:lnRef idx="1">
-            <a:schemeClr val="accent2"/>
-          </a:lnRef>
-          <a:fillRef idx="2">
-            <a:schemeClr val="accent2"/>
-          </a:fillRef>
-          <a:effectRef idx="1">
-            <a:schemeClr val="accent2"/>
-          </a:effectRef>
-          <a:fontRef idx="minor">
-            <a:schemeClr val="dk1"/>
-          </a:fontRef>
-        </p:style>
-      </p:cxnSp>
-      <p:sp>
-        <p:nvSpPr>
-          <p:cNvPr id="27" name="Flowchart: Decision 96">
-            <a:extLst>
-              <a:ext uri="{FF2B5EF4-FFF2-40B4-BE49-F238E27FC236}">
-                <a16:creationId xmlns:a16="http://schemas.microsoft.com/office/drawing/2014/main" id="{941E38F7-AE34-465B-A133-CD8BBF5EA823}"/>
-              </a:ext>
-            </a:extLst>
-          </p:cNvPr>
-          <p:cNvSpPr/>
-          <p:nvPr/>
-        </p:nvSpPr>
-        <p:spPr>
-          <a:xfrm>
-            <a:off x="2417085" y="2054539"/>
-            <a:ext cx="236048" cy="173380"/>
-          </a:xfrm>
-          <a:prstGeom prst="flowChartDecision">
-            <a:avLst/>
-          </a:prstGeom>
-          <a:noFill/>
-          <a:ln w="19050">
-            <a:solidFill>
-              <a:schemeClr val="accent6">
-                <a:lumMod val="75000"/>
-              </a:schemeClr>
-            </a:solidFill>
-          </a:ln>
-          <a:effectLst/>
-        </p:spPr>
-        <p:style>
-          <a:lnRef idx="1">
-            <a:schemeClr val="accent2"/>
-          </a:lnRef>
-          <a:fillRef idx="2">
-            <a:schemeClr val="accent2"/>
-          </a:fillRef>
-          <a:effectRef idx="1">
-            <a:schemeClr val="accent2"/>
-          </a:effectRef>
-          <a:fontRef idx="minor">
-            <a:schemeClr val="dk1"/>
-          </a:fontRef>
-        </p:style>
-        <p:txBody>
-          <a:bodyPr rtlCol="0" anchor="ctr"/>
-          <a:lstStyle/>
-          <a:p>
-            <a:pPr algn="ctr"/>
-            <a:endParaRPr lang="en-US" sz="1050">
-              <a:solidFill>
-                <a:schemeClr val="bg1"/>
-              </a:solidFill>
-            </a:endParaRPr>
-          </a:p>
-        </p:txBody>
-      </p:sp>
-      <p:sp>
-        <p:nvSpPr>
-          <p:cNvPr id="30" name="Rectangle 8">
-            <a:extLst>
-              <a:ext uri="{FF2B5EF4-FFF2-40B4-BE49-F238E27FC236}">
-                <a16:creationId xmlns:a16="http://schemas.microsoft.com/office/drawing/2014/main" id="{B187EB57-AC31-4BED-BFDA-43788F9DC338}"/>
-              </a:ext>
-            </a:extLst>
-          </p:cNvPr>
-          <p:cNvSpPr/>
-          <p:nvPr/>
-        </p:nvSpPr>
-        <p:spPr>
-          <a:xfrm>
-            <a:off x="2881808" y="1962924"/>
-            <a:ext cx="1323049" cy="346760"/>
-          </a:xfrm>
-          <a:prstGeom prst="rect">
-            <a:avLst/>
-          </a:prstGeom>
-          <a:solidFill>
-            <a:schemeClr val="accent6">
-              <a:lumMod val="75000"/>
-            </a:schemeClr>
-          </a:solidFill>
-          <a:ln w="19050">
-            <a:solidFill>
-              <a:schemeClr val="accent6">
-                <a:lumMod val="75000"/>
-              </a:schemeClr>
-            </a:solidFill>
-          </a:ln>
-          <a:effectLst/>
-        </p:spPr>
-        <p:style>
-          <a:lnRef idx="1">
-            <a:schemeClr val="accent2"/>
-          </a:lnRef>
-          <a:fillRef idx="2">
-            <a:schemeClr val="accent2"/>
-          </a:fillRef>
-          <a:effectRef idx="1">
-            <a:schemeClr val="accent2"/>
-          </a:effectRef>
-          <a:fontRef idx="minor">
-            <a:schemeClr val="dk1"/>
-          </a:fontRef>
-        </p:style>
-        <p:txBody>
-          <a:bodyPr rtlCol="0" anchor="ctr"/>
-          <a:lstStyle/>
-          <a:p>
-            <a:pPr algn="ctr"/>
-            <a:r>
-              <a:rPr lang="en-US" sz="1050" dirty="0">
-                <a:solidFill>
-                  <a:schemeClr val="bg1"/>
-                </a:solidFill>
-              </a:rPr>
-              <a:t>&lt;&lt;interface&gt;&gt;</a:t>
-            </a:r>
-            <a:br>
-              <a:rPr lang="en-US" sz="1050" dirty="0">
-                <a:solidFill>
-                  <a:schemeClr val="bg1"/>
-                </a:solidFill>
-              </a:rPr>
-            </a:br>
-            <a:r>
-              <a:rPr lang="en-US" sz="1050" dirty="0" err="1">
-                <a:solidFill>
-                  <a:schemeClr val="bg1"/>
-                </a:solidFill>
-              </a:rPr>
-              <a:t>TimeTableStorage</a:t>
-            </a:r>
-            <a:endParaRPr lang="en-SG" sz="1050" dirty="0">
-              <a:solidFill>
-                <a:schemeClr val="bg1"/>
-              </a:solidFill>
-            </a:endParaRPr>
-          </a:p>
-        </p:txBody>
-      </p:sp>
-      <p:cxnSp>
-        <p:nvCxnSpPr>
-          <p:cNvPr id="31" name="Elbow Connector 63">
-            <a:extLst>
-              <a:ext uri="{FF2B5EF4-FFF2-40B4-BE49-F238E27FC236}">
-                <a16:creationId xmlns:a16="http://schemas.microsoft.com/office/drawing/2014/main" id="{7704716A-3AB7-474A-B186-72C8FEA7A4E4}"/>
-              </a:ext>
-            </a:extLst>
-          </p:cNvPr>
-          <p:cNvCxnSpPr>
-            <a:stCxn id="32" idx="3"/>
-            <a:endCxn id="33" idx="1"/>
-          </p:cNvCxnSpPr>
-          <p:nvPr/>
-        </p:nvCxnSpPr>
-        <p:spPr>
-          <a:xfrm flipV="1">
-            <a:off x="4384830" y="2149258"/>
-            <a:ext cx="223324" cy="1"/>
-          </a:xfrm>
-          <a:prstGeom prst="bentConnector3">
-            <a:avLst>
-              <a:gd name="adj1" fmla="val 50000"/>
-            </a:avLst>
-          </a:prstGeom>
-          <a:ln w="19050">
-            <a:solidFill>
-              <a:schemeClr val="accent6">
-                <a:lumMod val="75000"/>
-              </a:schemeClr>
-            </a:solidFill>
-            <a:prstDash val="sysDot"/>
-            <a:headEnd type="none" w="med" len="med"/>
-            <a:tailEnd type="none" w="med" len="med"/>
-          </a:ln>
-          <a:effectLst/>
-        </p:spPr>
-        <p:style>
-          <a:lnRef idx="1">
-            <a:schemeClr val="accent2"/>
-          </a:lnRef>
-          <a:fillRef idx="2">
-            <a:schemeClr val="accent2"/>
-          </a:fillRef>
-          <a:effectRef idx="1">
-            <a:schemeClr val="accent2"/>
-          </a:effectRef>
-          <a:fontRef idx="minor">
-            <a:schemeClr val="dk1"/>
-          </a:fontRef>
-        </p:style>
-      </p:cxnSp>
-      <p:sp>
-        <p:nvSpPr>
-          <p:cNvPr id="32" name="Isosceles Triangle 102">
-            <a:extLst>
-              <a:ext uri="{FF2B5EF4-FFF2-40B4-BE49-F238E27FC236}">
-                <a16:creationId xmlns:a16="http://schemas.microsoft.com/office/drawing/2014/main" id="{BD35A4B0-C4C5-43C7-B4B8-9C039B788083}"/>
-              </a:ext>
-            </a:extLst>
-          </p:cNvPr>
-          <p:cNvSpPr/>
-          <p:nvPr/>
-        </p:nvSpPr>
-        <p:spPr>
-          <a:xfrm rot="5400000" flipV="1">
-            <a:off x="4161816" y="2061497"/>
-            <a:ext cx="270504" cy="175523"/>
-          </a:xfrm>
-          <a:prstGeom prst="triangle">
-            <a:avLst/>
-          </a:prstGeom>
-          <a:solidFill>
-            <a:schemeClr val="accent6">
-              <a:lumMod val="75000"/>
-            </a:schemeClr>
-          </a:solidFill>
-          <a:ln w="19050">
-            <a:solidFill>
-              <a:schemeClr val="accent6">
-                <a:lumMod val="75000"/>
-              </a:schemeClr>
-            </a:solidFill>
-          </a:ln>
-          <a:effectLst/>
-        </p:spPr>
-        <p:style>
-          <a:lnRef idx="1">
-            <a:schemeClr val="accent2"/>
-          </a:lnRef>
-          <a:fillRef idx="2">
-            <a:schemeClr val="accent2"/>
-          </a:fillRef>
-          <a:effectRef idx="1">
-            <a:schemeClr val="accent2"/>
-          </a:effectRef>
-          <a:fontRef idx="minor">
-            <a:schemeClr val="dk1"/>
-          </a:fontRef>
-        </p:style>
-        <p:txBody>
-          <a:bodyPr rtlCol="0" anchor="ctr"/>
-          <a:lstStyle/>
-          <a:p>
-            <a:pPr algn="ctr"/>
-            <a:endParaRPr lang="en-SG" sz="1050">
-              <a:solidFill>
-                <a:schemeClr val="bg1"/>
-              </a:solidFill>
-            </a:endParaRPr>
-          </a:p>
-        </p:txBody>
-      </p:sp>
-      <p:sp>
-        <p:nvSpPr>
-          <p:cNvPr id="33" name="Rectangle 8">
-            <a:extLst>
-              <a:ext uri="{FF2B5EF4-FFF2-40B4-BE49-F238E27FC236}">
-                <a16:creationId xmlns:a16="http://schemas.microsoft.com/office/drawing/2014/main" id="{0D3B7B7D-A351-464A-A2C1-6B36E0BC0B6A}"/>
-              </a:ext>
-            </a:extLst>
-          </p:cNvPr>
-          <p:cNvSpPr/>
-          <p:nvPr/>
-        </p:nvSpPr>
-        <p:spPr>
-          <a:xfrm>
-            <a:off x="4608154" y="1975878"/>
-            <a:ext cx="1093635" cy="346760"/>
-          </a:xfrm>
-          <a:prstGeom prst="rect">
-            <a:avLst/>
-          </a:prstGeom>
-          <a:solidFill>
-            <a:schemeClr val="accent6">
-              <a:lumMod val="75000"/>
-            </a:schemeClr>
-          </a:solidFill>
-          <a:ln w="19050">
-            <a:solidFill>
-              <a:schemeClr val="accent6">
-                <a:lumMod val="75000"/>
-              </a:schemeClr>
-            </a:solidFill>
-          </a:ln>
-          <a:effectLst/>
-        </p:spPr>
-        <p:style>
-          <a:lnRef idx="1">
-            <a:schemeClr val="accent2"/>
-          </a:lnRef>
-          <a:fillRef idx="2">
-            <a:schemeClr val="accent2"/>
-          </a:fillRef>
-          <a:effectRef idx="1">
-            <a:schemeClr val="accent2"/>
-          </a:effectRef>
-          <a:fontRef idx="minor">
-            <a:schemeClr val="dk1"/>
-          </a:fontRef>
-        </p:style>
-        <p:txBody>
-          <a:bodyPr rtlCol="0" anchor="ctr"/>
-          <a:lstStyle/>
-          <a:p>
-            <a:pPr algn="ctr"/>
-            <a:r>
-              <a:rPr lang="en-US" sz="1050" dirty="0" err="1">
-                <a:solidFill>
-                  <a:schemeClr val="bg1"/>
-                </a:solidFill>
-              </a:rPr>
-              <a:t>IcsTimeTable</a:t>
-            </a:r>
-            <a:endParaRPr lang="en-US" sz="1050" dirty="0">
-              <a:solidFill>
-                <a:schemeClr val="bg1"/>
-              </a:solidFill>
-            </a:endParaRPr>
-          </a:p>
-          <a:p>
-            <a:pPr algn="ctr"/>
-            <a:r>
-              <a:rPr lang="en-US" sz="1050" dirty="0">
-                <a:solidFill>
-                  <a:schemeClr val="bg1"/>
-                </a:solidFill>
-              </a:rPr>
-              <a:t>Storage</a:t>
-            </a:r>
-            <a:endParaRPr lang="en-SG" sz="1050" dirty="0">
-              <a:solidFill>
-                <a:schemeClr val="bg1"/>
-              </a:solidFill>
-            </a:endParaRPr>
-          </a:p>
-        </p:txBody>
-      </p:sp>
     </p:spTree>
     <p:extLst>
       <p:ext uri="{BB962C8B-B14F-4D97-AF65-F5344CB8AC3E}">

</xml_diff>